<commit_message>
Improved the tables and the caption bar in these figures
</commit_message>
<xml_diff>
--- a/Figures/04_MAE_ERA5_EDA.pptx
+++ b/Figures/04_MAE_ERA5_EDA.pptx
@@ -115,8 +115,7 @@
 <file path=ppt/revisionInfo.xml><?xml version="1.0" encoding="utf-8"?>
 <p1510:revInfo xmlns:a="http://schemas.openxmlformats.org/drawingml/2006/main" xmlns:r="http://schemas.openxmlformats.org/officeDocument/2006/relationships" xmlns:p1510="http://schemas.microsoft.com/office/powerpoint/2015/10/main">
   <p1510:revLst>
-    <p1510:client id="{3086F342-6630-4C99-88A3-934B0369170E}" v="2" dt="2026-02-03T14:11:48.904"/>
-    <p1510:client id="{CFA949F7-2BFE-41DB-AD57-BBDC1FF8D195}" v="34" dt="2026-02-03T22:20:47.654"/>
+    <p1510:client id="{CFA949F7-2BFE-41DB-AD57-BBDC1FF8D195}" v="45" dt="2026-02-08T23:43:42.775"/>
   </p1510:revLst>
 </p1510:revInfo>
 </file>
@@ -126,453 +125,22 @@
   <pc:docChgLst>
     <pc:chgData name="Fatima Pillosu" userId="a6295d4dc9e22643" providerId="LiveId" clId="{87453732-75AC-4426-B5D3-B7C69C2D4F54}"/>
     <pc:docChg chg="undo custSel addSld delSld modSld sldOrd">
-      <pc:chgData name="Fatima Pillosu" userId="a6295d4dc9e22643" providerId="LiveId" clId="{87453732-75AC-4426-B5D3-B7C69C2D4F54}" dt="2026-02-03T22:28:49.921" v="1377" actId="47"/>
+      <pc:chgData name="Fatima Pillosu" userId="a6295d4dc9e22643" providerId="LiveId" clId="{87453732-75AC-4426-B5D3-B7C69C2D4F54}" dt="2026-02-08T23:43:53.326" v="1415" actId="1035"/>
       <pc:docMkLst>
         <pc:docMk/>
       </pc:docMkLst>
-      <pc:sldChg chg="addSp delSp modSp del mod">
-        <pc:chgData name="Fatima Pillosu" userId="a6295d4dc9e22643" providerId="LiveId" clId="{87453732-75AC-4426-B5D3-B7C69C2D4F54}" dt="2026-02-03T22:21:32.103" v="1376" actId="47"/>
-        <pc:sldMkLst>
-          <pc:docMk/>
-          <pc:sldMk cId="1559877530" sldId="256"/>
-        </pc:sldMkLst>
-        <pc:spChg chg="del">
-          <ac:chgData name="Fatima Pillosu" userId="a6295d4dc9e22643" providerId="LiveId" clId="{87453732-75AC-4426-B5D3-B7C69C2D4F54}" dt="2026-02-03T21:25:02.323" v="2" actId="21"/>
-          <ac:spMkLst>
-            <pc:docMk/>
-            <pc:sldMk cId="1559877530" sldId="256"/>
-            <ac:spMk id="11" creationId="{AA3EBD54-4BE0-6553-ECEE-269D29285FFA}"/>
-          </ac:spMkLst>
-        </pc:spChg>
-        <pc:spChg chg="del">
-          <ac:chgData name="Fatima Pillosu" userId="a6295d4dc9e22643" providerId="LiveId" clId="{87453732-75AC-4426-B5D3-B7C69C2D4F54}" dt="2026-02-03T21:25:02.323" v="2" actId="21"/>
-          <ac:spMkLst>
-            <pc:docMk/>
-            <pc:sldMk cId="1559877530" sldId="256"/>
-            <ac:spMk id="18" creationId="{8FA878F1-E5FB-93E0-A384-F4F19A86095E}"/>
-          </ac:spMkLst>
-        </pc:spChg>
-        <pc:spChg chg="add mod">
-          <ac:chgData name="Fatima Pillosu" userId="a6295d4dc9e22643" providerId="LiveId" clId="{87453732-75AC-4426-B5D3-B7C69C2D4F54}" dt="2026-02-03T14:11:48.904" v="1"/>
-          <ac:spMkLst>
-            <pc:docMk/>
-            <pc:sldMk cId="1559877530" sldId="256"/>
-            <ac:spMk id="20" creationId="{9D5E5B2B-98BF-3FFD-401D-B151F02A6692}"/>
-          </ac:spMkLst>
-        </pc:spChg>
-        <pc:spChg chg="add mod">
-          <ac:chgData name="Fatima Pillosu" userId="a6295d4dc9e22643" providerId="LiveId" clId="{87453732-75AC-4426-B5D3-B7C69C2D4F54}" dt="2026-02-03T21:28:52.401" v="28" actId="255"/>
-          <ac:spMkLst>
-            <pc:docMk/>
-            <pc:sldMk cId="1559877530" sldId="256"/>
-            <ac:spMk id="22" creationId="{1B2CA034-F2EC-1835-114A-6474B22A84FE}"/>
-          </ac:spMkLst>
-        </pc:spChg>
-        <pc:spChg chg="del">
-          <ac:chgData name="Fatima Pillosu" userId="a6295d4dc9e22643" providerId="LiveId" clId="{87453732-75AC-4426-B5D3-B7C69C2D4F54}" dt="2026-02-03T21:25:02.323" v="2" actId="21"/>
-          <ac:spMkLst>
-            <pc:docMk/>
-            <pc:sldMk cId="1559877530" sldId="256"/>
-            <ac:spMk id="25" creationId="{560B8A4B-E900-9720-5303-54827B6E7E9F}"/>
-          </ac:spMkLst>
-        </pc:spChg>
-        <pc:spChg chg="del">
-          <ac:chgData name="Fatima Pillosu" userId="a6295d4dc9e22643" providerId="LiveId" clId="{87453732-75AC-4426-B5D3-B7C69C2D4F54}" dt="2026-02-03T14:11:28.777" v="0" actId="21"/>
-          <ac:spMkLst>
-            <pc:docMk/>
-            <pc:sldMk cId="1559877530" sldId="256"/>
-            <ac:spMk id="30" creationId="{AA3EBD54-4BE0-6553-ECEE-269D29285FFA}"/>
-          </ac:spMkLst>
-        </pc:spChg>
-        <pc:spChg chg="add mod">
-          <ac:chgData name="Fatima Pillosu" userId="a6295d4dc9e22643" providerId="LiveId" clId="{87453732-75AC-4426-B5D3-B7C69C2D4F54}" dt="2026-02-03T14:11:48.904" v="1"/>
-          <ac:spMkLst>
-            <pc:docMk/>
-            <pc:sldMk cId="1559877530" sldId="256"/>
-            <ac:spMk id="31" creationId="{8DBB8672-81E9-5524-3235-52016E620413}"/>
-          </ac:spMkLst>
-        </pc:spChg>
-        <pc:spChg chg="add del mod">
-          <ac:chgData name="Fatima Pillosu" userId="a6295d4dc9e22643" providerId="LiveId" clId="{87453732-75AC-4426-B5D3-B7C69C2D4F54}" dt="2026-02-03T21:26:31.170" v="17" actId="207"/>
-          <ac:spMkLst>
-            <pc:docMk/>
-            <pc:sldMk cId="1559877530" sldId="256"/>
-            <ac:spMk id="32" creationId="{DF944C2C-D058-9C30-8965-68254242CAB7}"/>
-          </ac:spMkLst>
-        </pc:spChg>
-        <pc:spChg chg="del">
-          <ac:chgData name="Fatima Pillosu" userId="a6295d4dc9e22643" providerId="LiveId" clId="{87453732-75AC-4426-B5D3-B7C69C2D4F54}" dt="2026-02-03T14:11:28.777" v="0" actId="21"/>
-          <ac:spMkLst>
-            <pc:docMk/>
-            <pc:sldMk cId="1559877530" sldId="256"/>
-            <ac:spMk id="37" creationId="{F4AF3F8A-6829-43C9-DEE6-58ADF1685970}"/>
-          </ac:spMkLst>
-        </pc:spChg>
-        <pc:spChg chg="del">
-          <ac:chgData name="Fatima Pillosu" userId="a6295d4dc9e22643" providerId="LiveId" clId="{87453732-75AC-4426-B5D3-B7C69C2D4F54}" dt="2026-02-03T21:25:02.323" v="2" actId="21"/>
-          <ac:spMkLst>
-            <pc:docMk/>
-            <pc:sldMk cId="1559877530" sldId="256"/>
-            <ac:spMk id="42" creationId="{30043C13-F81B-8A17-4739-6A807A4EB4C9}"/>
-          </ac:spMkLst>
-        </pc:spChg>
-        <pc:spChg chg="del">
-          <ac:chgData name="Fatima Pillosu" userId="a6295d4dc9e22643" providerId="LiveId" clId="{87453732-75AC-4426-B5D3-B7C69C2D4F54}" dt="2026-02-03T21:25:02.323" v="2" actId="21"/>
-          <ac:spMkLst>
-            <pc:docMk/>
-            <pc:sldMk cId="1559877530" sldId="256"/>
-            <ac:spMk id="43" creationId="{7D455F15-2356-62CA-C1A6-2C74E4961928}"/>
-          </ac:spMkLst>
-        </pc:spChg>
-        <pc:spChg chg="del">
-          <ac:chgData name="Fatima Pillosu" userId="a6295d4dc9e22643" providerId="LiveId" clId="{87453732-75AC-4426-B5D3-B7C69C2D4F54}" dt="2026-02-03T21:25:02.323" v="2" actId="21"/>
-          <ac:spMkLst>
-            <pc:docMk/>
-            <pc:sldMk cId="1559877530" sldId="256"/>
-            <ac:spMk id="48" creationId="{5AA2BA12-0538-B710-C7D4-28A93AA48CA2}"/>
-          </ac:spMkLst>
-        </pc:spChg>
-        <pc:spChg chg="add mod">
-          <ac:chgData name="Fatima Pillosu" userId="a6295d4dc9e22643" providerId="LiveId" clId="{87453732-75AC-4426-B5D3-B7C69C2D4F54}" dt="2026-02-03T14:11:48.904" v="1"/>
-          <ac:spMkLst>
-            <pc:docMk/>
-            <pc:sldMk cId="1559877530" sldId="256"/>
-            <ac:spMk id="50" creationId="{8BB97E0F-0A00-5EAA-B3E8-D235E91FF55E}"/>
-          </ac:spMkLst>
-        </pc:spChg>
-        <pc:spChg chg="add mod">
-          <ac:chgData name="Fatima Pillosu" userId="a6295d4dc9e22643" providerId="LiveId" clId="{87453732-75AC-4426-B5D3-B7C69C2D4F54}" dt="2026-02-03T14:11:48.904" v="1"/>
-          <ac:spMkLst>
-            <pc:docMk/>
-            <pc:sldMk cId="1559877530" sldId="256"/>
-            <ac:spMk id="51" creationId="{6397C483-3ADC-4663-3AD0-16C84D2AC935}"/>
-          </ac:spMkLst>
-        </pc:spChg>
-        <pc:spChg chg="del">
-          <ac:chgData name="Fatima Pillosu" userId="a6295d4dc9e22643" providerId="LiveId" clId="{87453732-75AC-4426-B5D3-B7C69C2D4F54}" dt="2026-02-03T21:25:02.323" v="2" actId="21"/>
-          <ac:spMkLst>
-            <pc:docMk/>
-            <pc:sldMk cId="1559877530" sldId="256"/>
-            <ac:spMk id="52" creationId="{262802C3-1629-5887-A0D1-6CB335B35208}"/>
-          </ac:spMkLst>
-        </pc:spChg>
-        <pc:spChg chg="add mod">
-          <ac:chgData name="Fatima Pillosu" userId="a6295d4dc9e22643" providerId="LiveId" clId="{87453732-75AC-4426-B5D3-B7C69C2D4F54}" dt="2026-02-03T21:26:31.170" v="17" actId="207"/>
-          <ac:spMkLst>
-            <pc:docMk/>
-            <pc:sldMk cId="1559877530" sldId="256"/>
-            <ac:spMk id="53" creationId="{0643030F-8CB0-CB0D-A047-8AE232E7CFDF}"/>
-          </ac:spMkLst>
-        </pc:spChg>
-        <pc:spChg chg="add mod">
-          <ac:chgData name="Fatima Pillosu" userId="a6295d4dc9e22643" providerId="LiveId" clId="{87453732-75AC-4426-B5D3-B7C69C2D4F54}" dt="2026-02-03T14:11:48.904" v="1"/>
-          <ac:spMkLst>
-            <pc:docMk/>
-            <pc:sldMk cId="1559877530" sldId="256"/>
-            <ac:spMk id="55" creationId="{66538639-46EA-DEA1-291F-2FDE1903CD55}"/>
-          </ac:spMkLst>
-        </pc:spChg>
-        <pc:spChg chg="del">
-          <ac:chgData name="Fatima Pillosu" userId="a6295d4dc9e22643" providerId="LiveId" clId="{87453732-75AC-4426-B5D3-B7C69C2D4F54}" dt="2026-02-03T21:25:02.323" v="2" actId="21"/>
-          <ac:spMkLst>
-            <pc:docMk/>
-            <pc:sldMk cId="1559877530" sldId="256"/>
-            <ac:spMk id="56" creationId="{8CF7156B-8EBC-E6E6-6035-0772622A8ABB}"/>
-          </ac:spMkLst>
-        </pc:spChg>
-        <pc:spChg chg="add mod">
-          <ac:chgData name="Fatima Pillosu" userId="a6295d4dc9e22643" providerId="LiveId" clId="{87453732-75AC-4426-B5D3-B7C69C2D4F54}" dt="2026-02-03T21:26:31.170" v="17" actId="207"/>
-          <ac:spMkLst>
-            <pc:docMk/>
-            <pc:sldMk cId="1559877530" sldId="256"/>
-            <ac:spMk id="57" creationId="{EFB1EFF7-1817-99ED-F980-35E466D9895D}"/>
-          </ac:spMkLst>
-        </pc:spChg>
-        <pc:spChg chg="add mod">
-          <ac:chgData name="Fatima Pillosu" userId="a6295d4dc9e22643" providerId="LiveId" clId="{87453732-75AC-4426-B5D3-B7C69C2D4F54}" dt="2026-02-03T14:11:48.904" v="1"/>
-          <ac:spMkLst>
-            <pc:docMk/>
-            <pc:sldMk cId="1559877530" sldId="256"/>
-            <ac:spMk id="60" creationId="{E6919208-AAA5-5C26-8BA1-2AC3AA832DDF}"/>
-          </ac:spMkLst>
-        </pc:spChg>
-        <pc:spChg chg="add mod">
-          <ac:chgData name="Fatima Pillosu" userId="a6295d4dc9e22643" providerId="LiveId" clId="{87453732-75AC-4426-B5D3-B7C69C2D4F54}" dt="2026-02-03T14:11:48.904" v="1"/>
-          <ac:spMkLst>
-            <pc:docMk/>
-            <pc:sldMk cId="1559877530" sldId="256"/>
-            <ac:spMk id="62" creationId="{5198D877-414E-2654-D95B-F16DB7DA8FE5}"/>
-          </ac:spMkLst>
-        </pc:spChg>
-        <pc:spChg chg="mod">
-          <ac:chgData name="Fatima Pillosu" userId="a6295d4dc9e22643" providerId="LiveId" clId="{87453732-75AC-4426-B5D3-B7C69C2D4F54}" dt="2026-02-03T21:28:52.401" v="28" actId="255"/>
-          <ac:spMkLst>
-            <pc:docMk/>
-            <pc:sldMk cId="1559877530" sldId="256"/>
-            <ac:spMk id="129" creationId="{F5EB9178-59C6-BF0F-A6A7-C4A35A5649D5}"/>
-          </ac:spMkLst>
-        </pc:spChg>
-        <pc:spChg chg="add mod">
-          <ac:chgData name="Fatima Pillosu" userId="a6295d4dc9e22643" providerId="LiveId" clId="{87453732-75AC-4426-B5D3-B7C69C2D4F54}" dt="2026-02-03T21:28:52.401" v="28" actId="255"/>
-          <ac:spMkLst>
-            <pc:docMk/>
-            <pc:sldMk cId="1559877530" sldId="256"/>
-            <ac:spMk id="133" creationId="{8DBB8672-81E9-5524-3235-52016E620413}"/>
-          </ac:spMkLst>
-        </pc:spChg>
-        <pc:spChg chg="mod">
-          <ac:chgData name="Fatima Pillosu" userId="a6295d4dc9e22643" providerId="LiveId" clId="{87453732-75AC-4426-B5D3-B7C69C2D4F54}" dt="2026-02-03T21:28:52.401" v="28" actId="255"/>
-          <ac:spMkLst>
-            <pc:docMk/>
-            <pc:sldMk cId="1559877530" sldId="256"/>
-            <ac:spMk id="137" creationId="{2C1DBA3D-50C3-7521-61B6-C83F6E4ECD7D}"/>
-          </ac:spMkLst>
-        </pc:spChg>
-        <pc:spChg chg="add mod">
-          <ac:chgData name="Fatima Pillosu" userId="a6295d4dc9e22643" providerId="LiveId" clId="{87453732-75AC-4426-B5D3-B7C69C2D4F54}" dt="2026-02-03T14:11:48.904" v="1"/>
-          <ac:spMkLst>
-            <pc:docMk/>
-            <pc:sldMk cId="1559877530" sldId="256"/>
-            <ac:spMk id="138" creationId="{FF239937-6C4D-5ADD-5B80-1392C47AE1EE}"/>
-          </ac:spMkLst>
-        </pc:spChg>
-        <pc:spChg chg="mod">
-          <ac:chgData name="Fatima Pillosu" userId="a6295d4dc9e22643" providerId="LiveId" clId="{87453732-75AC-4426-B5D3-B7C69C2D4F54}" dt="2026-02-03T21:26:27.100" v="16" actId="207"/>
-          <ac:spMkLst>
-            <pc:docMk/>
-            <pc:sldMk cId="1559877530" sldId="256"/>
-            <ac:spMk id="139" creationId="{6A68A7B4-6A8F-A8A3-45FB-29260F10D848}"/>
-          </ac:spMkLst>
-        </pc:spChg>
-        <pc:spChg chg="del">
-          <ac:chgData name="Fatima Pillosu" userId="a6295d4dc9e22643" providerId="LiveId" clId="{87453732-75AC-4426-B5D3-B7C69C2D4F54}" dt="2026-02-03T14:11:28.777" v="0" actId="21"/>
-          <ac:spMkLst>
-            <pc:docMk/>
-            <pc:sldMk cId="1559877530" sldId="256"/>
-            <ac:spMk id="147" creationId="{30043C13-F81B-8A17-4739-6A807A4EB4C9}"/>
-          </ac:spMkLst>
-        </pc:spChg>
-        <pc:spChg chg="del">
-          <ac:chgData name="Fatima Pillosu" userId="a6295d4dc9e22643" providerId="LiveId" clId="{87453732-75AC-4426-B5D3-B7C69C2D4F54}" dt="2026-02-03T14:11:28.777" v="0" actId="21"/>
-          <ac:spMkLst>
-            <pc:docMk/>
-            <pc:sldMk cId="1559877530" sldId="256"/>
-            <ac:spMk id="149" creationId="{3AC75CF9-72CE-BBDC-0B1A-0699C58E173E}"/>
-          </ac:spMkLst>
-        </pc:spChg>
-        <pc:spChg chg="add del mod">
-          <ac:chgData name="Fatima Pillosu" userId="a6295d4dc9e22643" providerId="LiveId" clId="{87453732-75AC-4426-B5D3-B7C69C2D4F54}" dt="2026-02-03T21:25:02.323" v="2" actId="21"/>
-          <ac:spMkLst>
-            <pc:docMk/>
-            <pc:sldMk cId="1559877530" sldId="256"/>
-            <ac:spMk id="150" creationId="{80B57857-85F3-AB36-54AC-C8C23D50EC87}"/>
-          </ac:spMkLst>
-        </pc:spChg>
-        <pc:spChg chg="add mod">
-          <ac:chgData name="Fatima Pillosu" userId="a6295d4dc9e22643" providerId="LiveId" clId="{87453732-75AC-4426-B5D3-B7C69C2D4F54}" dt="2026-02-03T14:11:48.904" v="1"/>
-          <ac:spMkLst>
-            <pc:docMk/>
-            <pc:sldMk cId="1559877530" sldId="256"/>
-            <ac:spMk id="152" creationId="{617B53B0-1FE0-0A4F-BD71-7DD6CB464749}"/>
-          </ac:spMkLst>
-        </pc:spChg>
-        <pc:spChg chg="del">
-          <ac:chgData name="Fatima Pillosu" userId="a6295d4dc9e22643" providerId="LiveId" clId="{87453732-75AC-4426-B5D3-B7C69C2D4F54}" dt="2026-02-03T21:25:02.323" v="2" actId="21"/>
-          <ac:spMkLst>
-            <pc:docMk/>
-            <pc:sldMk cId="1559877530" sldId="256"/>
-            <ac:spMk id="154" creationId="{5514FDCB-09A2-573A-31AB-236FE5992D4F}"/>
-          </ac:spMkLst>
-        </pc:spChg>
-        <pc:spChg chg="add mod">
-          <ac:chgData name="Fatima Pillosu" userId="a6295d4dc9e22643" providerId="LiveId" clId="{87453732-75AC-4426-B5D3-B7C69C2D4F54}" dt="2026-02-03T21:26:45.122" v="19" actId="207"/>
-          <ac:spMkLst>
-            <pc:docMk/>
-            <pc:sldMk cId="1559877530" sldId="256"/>
-            <ac:spMk id="178" creationId="{262802C3-1629-5887-A0D1-6CB335B35208}"/>
-          </ac:spMkLst>
-        </pc:spChg>
-        <pc:spChg chg="mod">
-          <ac:chgData name="Fatima Pillosu" userId="a6295d4dc9e22643" providerId="LiveId" clId="{87453732-75AC-4426-B5D3-B7C69C2D4F54}" dt="2026-02-03T21:27:03.059" v="21" actId="164"/>
-          <ac:spMkLst>
-            <pc:docMk/>
-            <pc:sldMk cId="1559877530" sldId="256"/>
-            <ac:spMk id="179" creationId="{D402FE2B-11F9-1801-0489-75FD22BB1548}"/>
-          </ac:spMkLst>
-        </pc:spChg>
-        <pc:spChg chg="mod">
-          <ac:chgData name="Fatima Pillosu" userId="a6295d4dc9e22643" providerId="LiveId" clId="{87453732-75AC-4426-B5D3-B7C69C2D4F54}" dt="2026-02-03T21:26:45.122" v="19" actId="207"/>
-          <ac:spMkLst>
-            <pc:docMk/>
-            <pc:sldMk cId="1559877530" sldId="256"/>
-            <ac:spMk id="187" creationId="{66538639-46EA-DEA1-291F-2FDE1903CD55}"/>
-          </ac:spMkLst>
-        </pc:spChg>
-        <pc:spChg chg="mod">
-          <ac:chgData name="Fatima Pillosu" userId="a6295d4dc9e22643" providerId="LiveId" clId="{87453732-75AC-4426-B5D3-B7C69C2D4F54}" dt="2026-02-03T21:27:03.059" v="21" actId="164"/>
-          <ac:spMkLst>
-            <pc:docMk/>
-            <pc:sldMk cId="1559877530" sldId="256"/>
-            <ac:spMk id="189" creationId="{8CF7156B-8EBC-E6E6-6035-0772622A8ABB}"/>
-          </ac:spMkLst>
-        </pc:spChg>
-        <pc:spChg chg="mod">
-          <ac:chgData name="Fatima Pillosu" userId="a6295d4dc9e22643" providerId="LiveId" clId="{87453732-75AC-4426-B5D3-B7C69C2D4F54}" dt="2026-02-03T21:27:03.059" v="21" actId="164"/>
-          <ac:spMkLst>
-            <pc:docMk/>
-            <pc:sldMk cId="1559877530" sldId="256"/>
-            <ac:spMk id="191" creationId="{F5543F6C-0C2C-D6AC-E57F-B58103D2839A}"/>
-          </ac:spMkLst>
-        </pc:spChg>
-        <pc:spChg chg="del mod">
-          <ac:chgData name="Fatima Pillosu" userId="a6295d4dc9e22643" providerId="LiveId" clId="{87453732-75AC-4426-B5D3-B7C69C2D4F54}" dt="2026-02-03T21:27:03.059" v="21" actId="164"/>
-          <ac:spMkLst>
-            <pc:docMk/>
-            <pc:sldMk cId="1559877530" sldId="256"/>
-            <ac:spMk id="193" creationId="{C2F09DEC-F677-5816-F69B-20D41705A04E}"/>
-          </ac:spMkLst>
-        </pc:spChg>
-        <pc:spChg chg="add del mod">
-          <ac:chgData name="Fatima Pillosu" userId="a6295d4dc9e22643" providerId="LiveId" clId="{87453732-75AC-4426-B5D3-B7C69C2D4F54}" dt="2026-02-03T21:26:51.548" v="20" actId="1076"/>
-          <ac:spMkLst>
-            <pc:docMk/>
-            <pc:sldMk cId="1559877530" sldId="256"/>
-            <ac:spMk id="194" creationId="{E6919208-AAA5-5C26-8BA1-2AC3AA832DDF}"/>
-          </ac:spMkLst>
-        </pc:spChg>
-        <pc:spChg chg="del">
-          <ac:chgData name="Fatima Pillosu" userId="a6295d4dc9e22643" providerId="LiveId" clId="{87453732-75AC-4426-B5D3-B7C69C2D4F54}" dt="2026-02-03T21:46:22.333" v="467" actId="478"/>
-          <ac:spMkLst>
-            <pc:docMk/>
-            <pc:sldMk cId="1559877530" sldId="256"/>
-            <ac:spMk id="195" creationId="{5198D877-414E-2654-D95B-F16DB7DA8FE5}"/>
-          </ac:spMkLst>
-        </pc:spChg>
-        <pc:spChg chg="add mod">
-          <ac:chgData name="Fatima Pillosu" userId="a6295d4dc9e22643" providerId="LiveId" clId="{87453732-75AC-4426-B5D3-B7C69C2D4F54}" dt="2026-02-03T21:26:31.170" v="17" actId="207"/>
-          <ac:spMkLst>
-            <pc:docMk/>
-            <pc:sldMk cId="1559877530" sldId="256"/>
-            <ac:spMk id="204" creationId="{FF239937-6C4D-5ADD-5B80-1392C47AE1EE}"/>
-          </ac:spMkLst>
-        </pc:spChg>
-        <pc:spChg chg="mod">
-          <ac:chgData name="Fatima Pillosu" userId="a6295d4dc9e22643" providerId="LiveId" clId="{87453732-75AC-4426-B5D3-B7C69C2D4F54}" dt="2026-02-03T21:27:03.059" v="21" actId="164"/>
-          <ac:spMkLst>
-            <pc:docMk/>
-            <pc:sldMk cId="1559877530" sldId="256"/>
-            <ac:spMk id="205" creationId="{B927261F-31E0-5343-76B7-DE58A22FD468}"/>
-          </ac:spMkLst>
-        </pc:spChg>
-        <pc:spChg chg="mod">
-          <ac:chgData name="Fatima Pillosu" userId="a6295d4dc9e22643" providerId="LiveId" clId="{87453732-75AC-4426-B5D3-B7C69C2D4F54}" dt="2026-02-03T21:27:03.059" v="21" actId="164"/>
-          <ac:spMkLst>
-            <pc:docMk/>
-            <pc:sldMk cId="1559877530" sldId="256"/>
-            <ac:spMk id="206" creationId="{39CCCF4A-F565-930C-0E03-E42056C735D6}"/>
-          </ac:spMkLst>
-        </pc:spChg>
-        <pc:spChg chg="mod">
-          <ac:chgData name="Fatima Pillosu" userId="a6295d4dc9e22643" providerId="LiveId" clId="{87453732-75AC-4426-B5D3-B7C69C2D4F54}" dt="2026-02-03T21:27:03.059" v="21" actId="164"/>
-          <ac:spMkLst>
-            <pc:docMk/>
-            <pc:sldMk cId="1559877530" sldId="256"/>
-            <ac:spMk id="208" creationId="{448E38A7-2B09-8542-1F5B-E84653CD9E75}"/>
-          </ac:spMkLst>
-        </pc:spChg>
-        <pc:spChg chg="del mod">
-          <ac:chgData name="Fatima Pillosu" userId="a6295d4dc9e22643" providerId="LiveId" clId="{87453732-75AC-4426-B5D3-B7C69C2D4F54}" dt="2026-02-03T21:27:03.059" v="21" actId="164"/>
-          <ac:spMkLst>
-            <pc:docMk/>
-            <pc:sldMk cId="1559877530" sldId="256"/>
-            <ac:spMk id="209" creationId="{80B57857-85F3-AB36-54AC-C8C23D50EC87}"/>
-          </ac:spMkLst>
-        </pc:spChg>
-        <pc:spChg chg="add mod">
-          <ac:chgData name="Fatima Pillosu" userId="a6295d4dc9e22643" providerId="LiveId" clId="{87453732-75AC-4426-B5D3-B7C69C2D4F54}" dt="2026-02-03T21:27:03.059" v="21" actId="164"/>
-          <ac:spMkLst>
-            <pc:docMk/>
-            <pc:sldMk cId="1559877530" sldId="256"/>
-            <ac:spMk id="210" creationId="{617B53B0-1FE0-0A4F-BD71-7DD6CB464749}"/>
-          </ac:spMkLst>
-        </pc:spChg>
-        <pc:spChg chg="add mod">
-          <ac:chgData name="Fatima Pillosu" userId="a6295d4dc9e22643" providerId="LiveId" clId="{87453732-75AC-4426-B5D3-B7C69C2D4F54}" dt="2026-02-03T21:27:03.059" v="21" actId="164"/>
-          <ac:spMkLst>
-            <pc:docMk/>
-            <pc:sldMk cId="1559877530" sldId="256"/>
-            <ac:spMk id="212" creationId="{38D540F9-0956-2883-8C77-E4909D11A7F1}"/>
-          </ac:spMkLst>
-        </pc:spChg>
-        <pc:spChg chg="del">
-          <ac:chgData name="Fatima Pillosu" userId="a6295d4dc9e22643" providerId="LiveId" clId="{87453732-75AC-4426-B5D3-B7C69C2D4F54}" dt="2026-02-03T14:11:28.777" v="0" actId="21"/>
-          <ac:spMkLst>
-            <pc:docMk/>
-            <pc:sldMk cId="1559877530" sldId="256"/>
-            <ac:spMk id="213" creationId="{DB381217-AB67-D6E5-E0C6-4178E943B103}"/>
-          </ac:spMkLst>
-        </pc:spChg>
-        <pc:grpChg chg="del mod">
-          <ac:chgData name="Fatima Pillosu" userId="a6295d4dc9e22643" providerId="LiveId" clId="{87453732-75AC-4426-B5D3-B7C69C2D4F54}" dt="2026-02-03T21:28:03.661" v="25" actId="478"/>
-          <ac:grpSpMkLst>
-            <pc:docMk/>
-            <pc:sldMk cId="1559877530" sldId="256"/>
-            <ac:grpSpMk id="242" creationId="{2B75293D-14C2-C486-FD81-1D839A286CF0}"/>
-          </ac:grpSpMkLst>
-        </pc:grpChg>
-        <pc:picChg chg="add del">
-          <ac:chgData name="Fatima Pillosu" userId="a6295d4dc9e22643" providerId="LiveId" clId="{87453732-75AC-4426-B5D3-B7C69C2D4F54}" dt="2026-02-03T21:25:54.536" v="9" actId="478"/>
-          <ac:picMkLst>
-            <pc:docMk/>
-            <pc:sldMk cId="1559877530" sldId="256"/>
-            <ac:picMk id="238" creationId="{4CD2045B-1B95-8E9F-A9E4-D2026D101F37}"/>
-          </ac:picMkLst>
-        </pc:picChg>
-        <pc:picChg chg="add del">
-          <ac:chgData name="Fatima Pillosu" userId="a6295d4dc9e22643" providerId="LiveId" clId="{87453732-75AC-4426-B5D3-B7C69C2D4F54}" dt="2026-02-03T21:25:59.386" v="12" actId="478"/>
-          <ac:picMkLst>
-            <pc:docMk/>
-            <pc:sldMk cId="1559877530" sldId="256"/>
-            <ac:picMk id="239" creationId="{BAFA8894-63BE-5D04-65F9-7A31CCAFFBAE}"/>
-          </ac:picMkLst>
-        </pc:picChg>
-        <pc:picChg chg="del">
-          <ac:chgData name="Fatima Pillosu" userId="a6295d4dc9e22643" providerId="LiveId" clId="{87453732-75AC-4426-B5D3-B7C69C2D4F54}" dt="2026-02-03T21:25:55.114" v="10" actId="478"/>
-          <ac:picMkLst>
-            <pc:docMk/>
-            <pc:sldMk cId="1559877530" sldId="256"/>
-            <ac:picMk id="240" creationId="{1819A6E8-BDE2-42B4-D7A3-F27E43F19FE5}"/>
-          </ac:picMkLst>
-        </pc:picChg>
-        <pc:picChg chg="del">
-          <ac:chgData name="Fatima Pillosu" userId="a6295d4dc9e22643" providerId="LiveId" clId="{87453732-75AC-4426-B5D3-B7C69C2D4F54}" dt="2026-02-03T21:25:55.885" v="11" actId="478"/>
-          <ac:picMkLst>
-            <pc:docMk/>
-            <pc:sldMk cId="1559877530" sldId="256"/>
-            <ac:picMk id="241" creationId="{933FF925-33C0-5DCC-C373-425C9D6C504E}"/>
-          </ac:picMkLst>
-        </pc:picChg>
-        <pc:picChg chg="add del mod">
-          <ac:chgData name="Fatima Pillosu" userId="a6295d4dc9e22643" providerId="LiveId" clId="{87453732-75AC-4426-B5D3-B7C69C2D4F54}" dt="2026-02-03T21:29:21.922" v="31" actId="478"/>
-          <ac:picMkLst>
-            <pc:docMk/>
-            <pc:sldMk cId="1559877530" sldId="256"/>
-            <ac:picMk id="243" creationId="{9203CC87-F9DA-F669-7BBC-9613BB664127}"/>
-          </ac:picMkLst>
-        </pc:picChg>
-      </pc:sldChg>
       <pc:sldChg chg="addSp delSp modSp add mod ord">
-        <pc:chgData name="Fatima Pillosu" userId="a6295d4dc9e22643" providerId="LiveId" clId="{87453732-75AC-4426-B5D3-B7C69C2D4F54}" dt="2026-02-03T22:17:28.434" v="1319" actId="20577"/>
+        <pc:chgData name="Fatima Pillosu" userId="a6295d4dc9e22643" providerId="LiveId" clId="{87453732-75AC-4426-B5D3-B7C69C2D4F54}" dt="2026-02-08T23:43:53.326" v="1415" actId="1035"/>
         <pc:sldMkLst>
           <pc:docMk/>
           <pc:sldMk cId="2218816855" sldId="257"/>
         </pc:sldMkLst>
-        <pc:spChg chg="add del">
-          <ac:chgData name="Fatima Pillosu" userId="a6295d4dc9e22643" providerId="LiveId" clId="{87453732-75AC-4426-B5D3-B7C69C2D4F54}" dt="2026-02-03T21:47:11.140" v="476" actId="22"/>
+        <pc:spChg chg="add mod">
+          <ac:chgData name="Fatima Pillosu" userId="a6295d4dc9e22643" providerId="LiveId" clId="{87453732-75AC-4426-B5D3-B7C69C2D4F54}" dt="2026-02-08T23:35:33.304" v="1389" actId="164"/>
           <ac:spMkLst>
             <pc:docMk/>
             <pc:sldMk cId="2218816855" sldId="257"/>
-            <ac:spMk id="9" creationId="{BD83D84A-DB30-2AD5-2491-8F81D602167F}"/>
+            <ac:spMk id="3" creationId="{633376AF-A334-D202-54CF-B65F8E7AEAAD}"/>
           </ac:spMkLst>
         </pc:spChg>
         <pc:spChg chg="add mod">
@@ -616,54 +184,6 @@
           </ac:spMkLst>
         </pc:spChg>
         <pc:spChg chg="add mod">
-          <ac:chgData name="Fatima Pillosu" userId="a6295d4dc9e22643" providerId="LiveId" clId="{87453732-75AC-4426-B5D3-B7C69C2D4F54}" dt="2026-02-03T21:49:58.137" v="704"/>
-          <ac:spMkLst>
-            <pc:docMk/>
-            <pc:sldMk cId="2218816855" sldId="257"/>
-            <ac:spMk id="18" creationId="{D1EEF875-9895-8F58-F578-6E56264BBB7E}"/>
-          </ac:spMkLst>
-        </pc:spChg>
-        <pc:spChg chg="add mod">
-          <ac:chgData name="Fatima Pillosu" userId="a6295d4dc9e22643" providerId="LiveId" clId="{87453732-75AC-4426-B5D3-B7C69C2D4F54}" dt="2026-02-03T21:49:58.137" v="704"/>
-          <ac:spMkLst>
-            <pc:docMk/>
-            <pc:sldMk cId="2218816855" sldId="257"/>
-            <ac:spMk id="19" creationId="{AC91FF2C-653B-F74F-E01A-5F6EDBED833C}"/>
-          </ac:spMkLst>
-        </pc:spChg>
-        <pc:spChg chg="add mod">
-          <ac:chgData name="Fatima Pillosu" userId="a6295d4dc9e22643" providerId="LiveId" clId="{87453732-75AC-4426-B5D3-B7C69C2D4F54}" dt="2026-02-03T21:49:58.137" v="704"/>
-          <ac:spMkLst>
-            <pc:docMk/>
-            <pc:sldMk cId="2218816855" sldId="257"/>
-            <ac:spMk id="20" creationId="{17F20188-AA9E-86F2-CFFD-BF5989B711F2}"/>
-          </ac:spMkLst>
-        </pc:spChg>
-        <pc:spChg chg="del mod">
-          <ac:chgData name="Fatima Pillosu" userId="a6295d4dc9e22643" providerId="LiveId" clId="{87453732-75AC-4426-B5D3-B7C69C2D4F54}" dt="2026-02-03T21:37:32.558" v="435" actId="478"/>
-          <ac:spMkLst>
-            <pc:docMk/>
-            <pc:sldMk cId="2218816855" sldId="257"/>
-            <ac:spMk id="22" creationId="{59BE9C22-6F21-BC42-6D9A-58619E83C6BB}"/>
-          </ac:spMkLst>
-        </pc:spChg>
-        <pc:spChg chg="add mod">
-          <ac:chgData name="Fatima Pillosu" userId="a6295d4dc9e22643" providerId="LiveId" clId="{87453732-75AC-4426-B5D3-B7C69C2D4F54}" dt="2026-02-03T21:49:58.137" v="704"/>
-          <ac:spMkLst>
-            <pc:docMk/>
-            <pc:sldMk cId="2218816855" sldId="257"/>
-            <ac:spMk id="23" creationId="{C60E5AEB-B60C-CAED-3150-D711722F9BB1}"/>
-          </ac:spMkLst>
-        </pc:spChg>
-        <pc:spChg chg="add mod">
-          <ac:chgData name="Fatima Pillosu" userId="a6295d4dc9e22643" providerId="LiveId" clId="{87453732-75AC-4426-B5D3-B7C69C2D4F54}" dt="2026-02-03T21:49:58.137" v="704"/>
-          <ac:spMkLst>
-            <pc:docMk/>
-            <pc:sldMk cId="2218816855" sldId="257"/>
-            <ac:spMk id="24" creationId="{D6C9FC1B-F64C-F911-7A54-FA33DA781AA2}"/>
-          </ac:spMkLst>
-        </pc:spChg>
-        <pc:spChg chg="add mod">
           <ac:chgData name="Fatima Pillosu" userId="a6295d4dc9e22643" providerId="LiveId" clId="{87453732-75AC-4426-B5D3-B7C69C2D4F54}" dt="2026-02-03T22:00:59.875" v="1186" actId="20577"/>
           <ac:spMkLst>
             <pc:docMk/>
@@ -677,54 +197,6 @@
             <pc:docMk/>
             <pc:sldMk cId="2218816855" sldId="257"/>
             <ac:spMk id="26" creationId="{F55F1E4C-2C13-86AC-9BE6-0A894381476A}"/>
-          </ac:spMkLst>
-        </pc:spChg>
-        <pc:spChg chg="del">
-          <ac:chgData name="Fatima Pillosu" userId="a6295d4dc9e22643" providerId="LiveId" clId="{87453732-75AC-4426-B5D3-B7C69C2D4F54}" dt="2026-02-03T21:37:26.513" v="432" actId="478"/>
-          <ac:spMkLst>
-            <pc:docMk/>
-            <pc:sldMk cId="2218816855" sldId="257"/>
-            <ac:spMk id="27" creationId="{EDA7C259-1C85-D16B-61F1-8B6D3DDC5E5A}"/>
-          </ac:spMkLst>
-        </pc:spChg>
-        <pc:spChg chg="del">
-          <ac:chgData name="Fatima Pillosu" userId="a6295d4dc9e22643" providerId="LiveId" clId="{87453732-75AC-4426-B5D3-B7C69C2D4F54}" dt="2026-02-03T21:37:26.513" v="432" actId="478"/>
-          <ac:spMkLst>
-            <pc:docMk/>
-            <pc:sldMk cId="2218816855" sldId="257"/>
-            <ac:spMk id="30" creationId="{5223AFAF-62B6-7D4A-A146-CE021C37C660}"/>
-          </ac:spMkLst>
-        </pc:spChg>
-        <pc:spChg chg="del">
-          <ac:chgData name="Fatima Pillosu" userId="a6295d4dc9e22643" providerId="LiveId" clId="{87453732-75AC-4426-B5D3-B7C69C2D4F54}" dt="2026-02-03T21:37:26.513" v="432" actId="478"/>
-          <ac:spMkLst>
-            <pc:docMk/>
-            <pc:sldMk cId="2218816855" sldId="257"/>
-            <ac:spMk id="32" creationId="{85BFECE1-D0B4-9C76-084D-7ED1FFF492D7}"/>
-          </ac:spMkLst>
-        </pc:spChg>
-        <pc:spChg chg="del">
-          <ac:chgData name="Fatima Pillosu" userId="a6295d4dc9e22643" providerId="LiveId" clId="{87453732-75AC-4426-B5D3-B7C69C2D4F54}" dt="2026-02-03T21:37:26.513" v="432" actId="478"/>
-          <ac:spMkLst>
-            <pc:docMk/>
-            <pc:sldMk cId="2218816855" sldId="257"/>
-            <ac:spMk id="33" creationId="{8383B834-6DCC-83B1-4B20-7F7C80CE3EDE}"/>
-          </ac:spMkLst>
-        </pc:spChg>
-        <pc:spChg chg="del">
-          <ac:chgData name="Fatima Pillosu" userId="a6295d4dc9e22643" providerId="LiveId" clId="{87453732-75AC-4426-B5D3-B7C69C2D4F54}" dt="2026-02-03T21:37:26.513" v="432" actId="478"/>
-          <ac:spMkLst>
-            <pc:docMk/>
-            <pc:sldMk cId="2218816855" sldId="257"/>
-            <ac:spMk id="41" creationId="{CAAB451E-A81D-57EA-E880-D5CB7605DB97}"/>
-          </ac:spMkLst>
-        </pc:spChg>
-        <pc:spChg chg="del">
-          <ac:chgData name="Fatima Pillosu" userId="a6295d4dc9e22643" providerId="LiveId" clId="{87453732-75AC-4426-B5D3-B7C69C2D4F54}" dt="2026-02-03T21:37:26.513" v="432" actId="478"/>
-          <ac:spMkLst>
-            <pc:docMk/>
-            <pc:sldMk cId="2218816855" sldId="257"/>
-            <ac:spMk id="45" creationId="{F0E81D7E-DE25-0699-6F6A-1395E862B277}"/>
           </ac:spMkLst>
         </pc:spChg>
         <pc:spChg chg="mod">
@@ -759,30 +231,6 @@
             <ac:spMk id="61" creationId="{882AE356-8AD6-6609-5A4C-2430E217B456}"/>
           </ac:spMkLst>
         </pc:spChg>
-        <pc:spChg chg="del mod">
-          <ac:chgData name="Fatima Pillosu" userId="a6295d4dc9e22643" providerId="LiveId" clId="{87453732-75AC-4426-B5D3-B7C69C2D4F54}" dt="2026-02-03T21:37:37.198" v="438" actId="478"/>
-          <ac:spMkLst>
-            <pc:docMk/>
-            <pc:sldMk cId="2218816855" sldId="257"/>
-            <ac:spMk id="129" creationId="{A78B0DE2-89EB-492A-CEBA-35E1285A6953}"/>
-          </ac:spMkLst>
-        </pc:spChg>
-        <pc:spChg chg="del mod">
-          <ac:chgData name="Fatima Pillosu" userId="a6295d4dc9e22643" providerId="LiveId" clId="{87453732-75AC-4426-B5D3-B7C69C2D4F54}" dt="2026-02-03T21:37:34.612" v="436" actId="478"/>
-          <ac:spMkLst>
-            <pc:docMk/>
-            <pc:sldMk cId="2218816855" sldId="257"/>
-            <ac:spMk id="133" creationId="{3931503C-D3DF-B166-E3CF-DF466B3DE7D1}"/>
-          </ac:spMkLst>
-        </pc:spChg>
-        <pc:spChg chg="del mod">
-          <ac:chgData name="Fatima Pillosu" userId="a6295d4dc9e22643" providerId="LiveId" clId="{87453732-75AC-4426-B5D3-B7C69C2D4F54}" dt="2026-02-03T21:37:31.428" v="434" actId="478"/>
-          <ac:spMkLst>
-            <pc:docMk/>
-            <pc:sldMk cId="2218816855" sldId="257"/>
-            <ac:spMk id="137" creationId="{3F8D1E0B-48F9-C97E-B864-6288CA57B654}"/>
-          </ac:spMkLst>
-        </pc:spChg>
         <pc:spChg chg="mod">
           <ac:chgData name="Fatima Pillosu" userId="a6295d4dc9e22643" providerId="LiveId" clId="{87453732-75AC-4426-B5D3-B7C69C2D4F54}" dt="2026-02-03T22:17:28.434" v="1319" actId="20577"/>
           <ac:spMkLst>
@@ -799,140 +247,12 @@
             <ac:spMk id="141" creationId="{6B53498A-CE6D-B303-A8D5-5A811F70972A}"/>
           </ac:spMkLst>
         </pc:spChg>
-        <pc:spChg chg="del">
-          <ac:chgData name="Fatima Pillosu" userId="a6295d4dc9e22643" providerId="LiveId" clId="{87453732-75AC-4426-B5D3-B7C69C2D4F54}" dt="2026-02-03T21:37:26.513" v="432" actId="478"/>
-          <ac:spMkLst>
-            <pc:docMk/>
-            <pc:sldMk cId="2218816855" sldId="257"/>
-            <ac:spMk id="145" creationId="{DFB9EA3B-791F-CE87-9CD7-604BAEBA1BF0}"/>
-          </ac:spMkLst>
-        </pc:spChg>
-        <pc:spChg chg="del">
-          <ac:chgData name="Fatima Pillosu" userId="a6295d4dc9e22643" providerId="LiveId" clId="{87453732-75AC-4426-B5D3-B7C69C2D4F54}" dt="2026-02-03T21:37:26.513" v="432" actId="478"/>
-          <ac:spMkLst>
-            <pc:docMk/>
-            <pc:sldMk cId="2218816855" sldId="257"/>
-            <ac:spMk id="147" creationId="{2E400C64-0041-4570-6AF7-CD1B1ECE8AFC}"/>
-          </ac:spMkLst>
-        </pc:spChg>
-        <pc:spChg chg="del">
-          <ac:chgData name="Fatima Pillosu" userId="a6295d4dc9e22643" providerId="LiveId" clId="{87453732-75AC-4426-B5D3-B7C69C2D4F54}" dt="2026-02-03T21:37:26.513" v="432" actId="478"/>
-          <ac:spMkLst>
-            <pc:docMk/>
-            <pc:sldMk cId="2218816855" sldId="257"/>
-            <ac:spMk id="148" creationId="{F9DED53A-658E-CBFE-D827-B363AFEF839A}"/>
-          </ac:spMkLst>
-        </pc:spChg>
-        <pc:spChg chg="del">
-          <ac:chgData name="Fatima Pillosu" userId="a6295d4dc9e22643" providerId="LiveId" clId="{87453732-75AC-4426-B5D3-B7C69C2D4F54}" dt="2026-02-03T21:37:26.513" v="432" actId="478"/>
-          <ac:spMkLst>
-            <pc:docMk/>
-            <pc:sldMk cId="2218816855" sldId="257"/>
-            <ac:spMk id="149" creationId="{32A1EA72-780E-B706-1247-24097DC4EE67}"/>
-          </ac:spMkLst>
-        </pc:spChg>
-        <pc:spChg chg="del">
-          <ac:chgData name="Fatima Pillosu" userId="a6295d4dc9e22643" providerId="LiveId" clId="{87453732-75AC-4426-B5D3-B7C69C2D4F54}" dt="2026-02-03T21:37:29.908" v="433" actId="478"/>
-          <ac:spMkLst>
-            <pc:docMk/>
-            <pc:sldMk cId="2218816855" sldId="257"/>
-            <ac:spMk id="151" creationId="{9E0355F3-28AD-3B5B-BCEC-15E7867E1919}"/>
-          </ac:spMkLst>
-        </pc:spChg>
-        <pc:spChg chg="del">
-          <ac:chgData name="Fatima Pillosu" userId="a6295d4dc9e22643" providerId="LiveId" clId="{87453732-75AC-4426-B5D3-B7C69C2D4F54}" dt="2026-02-03T21:37:29.908" v="433" actId="478"/>
-          <ac:spMkLst>
-            <pc:docMk/>
-            <pc:sldMk cId="2218816855" sldId="257"/>
-            <ac:spMk id="153" creationId="{66F01BAB-15A9-65D7-8FC7-C081BCE45E03}"/>
-          </ac:spMkLst>
-        </pc:spChg>
-        <pc:spChg chg="del">
-          <ac:chgData name="Fatima Pillosu" userId="a6295d4dc9e22643" providerId="LiveId" clId="{87453732-75AC-4426-B5D3-B7C69C2D4F54}" dt="2026-02-03T21:37:29.908" v="433" actId="478"/>
-          <ac:spMkLst>
-            <pc:docMk/>
-            <pc:sldMk cId="2218816855" sldId="257"/>
-            <ac:spMk id="155" creationId="{3709EB82-6FD8-7D0F-2955-AD8B336B948B}"/>
-          </ac:spMkLst>
-        </pc:spChg>
-        <pc:spChg chg="del">
-          <ac:chgData name="Fatima Pillosu" userId="a6295d4dc9e22643" providerId="LiveId" clId="{87453732-75AC-4426-B5D3-B7C69C2D4F54}" dt="2026-02-03T21:37:29.908" v="433" actId="478"/>
-          <ac:spMkLst>
-            <pc:docMk/>
-            <pc:sldMk cId="2218816855" sldId="257"/>
-            <ac:spMk id="158" creationId="{9E5250A0-B419-A9A3-0ACE-D2DD527E31A8}"/>
-          </ac:spMkLst>
-        </pc:spChg>
-        <pc:spChg chg="del">
-          <ac:chgData name="Fatima Pillosu" userId="a6295d4dc9e22643" providerId="LiveId" clId="{87453732-75AC-4426-B5D3-B7C69C2D4F54}" dt="2026-02-03T21:37:29.908" v="433" actId="478"/>
-          <ac:spMkLst>
-            <pc:docMk/>
-            <pc:sldMk cId="2218816855" sldId="257"/>
-            <ac:spMk id="169" creationId="{D06812B0-5CE1-C455-8528-E3E5F8633136}"/>
-          </ac:spMkLst>
-        </pc:spChg>
         <pc:spChg chg="mod topLvl">
           <ac:chgData name="Fatima Pillosu" userId="a6295d4dc9e22643" providerId="LiveId" clId="{87453732-75AC-4426-B5D3-B7C69C2D4F54}" dt="2026-02-03T21:54:31.508" v="957" actId="164"/>
           <ac:spMkLst>
             <pc:docMk/>
             <pc:sldMk cId="2218816855" sldId="257"/>
             <ac:spMk id="178" creationId="{5178F739-890C-7A79-5134-976512F0C0EF}"/>
-          </ac:spMkLst>
-        </pc:spChg>
-        <pc:spChg chg="del mod">
-          <ac:chgData name="Fatima Pillosu" userId="a6295d4dc9e22643" providerId="LiveId" clId="{87453732-75AC-4426-B5D3-B7C69C2D4F54}" dt="2026-02-03T21:30:37.304" v="52"/>
-          <ac:spMkLst>
-            <pc:docMk/>
-            <pc:sldMk cId="2218816855" sldId="257"/>
-            <ac:spMk id="179" creationId="{63643D01-CC0A-55BB-33CC-31688D203596}"/>
-          </ac:spMkLst>
-        </pc:spChg>
-        <pc:spChg chg="del mod">
-          <ac:chgData name="Fatima Pillosu" userId="a6295d4dc9e22643" providerId="LiveId" clId="{87453732-75AC-4426-B5D3-B7C69C2D4F54}" dt="2026-02-03T21:30:37.306" v="54"/>
-          <ac:spMkLst>
-            <pc:docMk/>
-            <pc:sldMk cId="2218816855" sldId="257"/>
-            <ac:spMk id="187" creationId="{AA5932E8-6E98-636F-A0D2-58442D93C1C0}"/>
-          </ac:spMkLst>
-        </pc:spChg>
-        <pc:spChg chg="del mod topLvl">
-          <ac:chgData name="Fatima Pillosu" userId="a6295d4dc9e22643" providerId="LiveId" clId="{87453732-75AC-4426-B5D3-B7C69C2D4F54}" dt="2026-02-03T21:30:37.306" v="58"/>
-          <ac:spMkLst>
-            <pc:docMk/>
-            <pc:sldMk cId="2218816855" sldId="257"/>
-            <ac:spMk id="189" creationId="{C4955E70-C9C9-C7A7-2DE9-5D8F93E2BD1C}"/>
-          </ac:spMkLst>
-        </pc:spChg>
-        <pc:spChg chg="del mod topLvl">
-          <ac:chgData name="Fatima Pillosu" userId="a6295d4dc9e22643" providerId="LiveId" clId="{87453732-75AC-4426-B5D3-B7C69C2D4F54}" dt="2026-02-03T21:30:37.306" v="56"/>
-          <ac:spMkLst>
-            <pc:docMk/>
-            <pc:sldMk cId="2218816855" sldId="257"/>
-            <ac:spMk id="191" creationId="{25620D9F-E017-8FD3-66B0-A4204DFC18AD}"/>
-          </ac:spMkLst>
-        </pc:spChg>
-        <pc:spChg chg="del mod topLvl">
-          <ac:chgData name="Fatima Pillosu" userId="a6295d4dc9e22643" providerId="LiveId" clId="{87453732-75AC-4426-B5D3-B7C69C2D4F54}" dt="2026-02-03T21:30:37.308" v="60"/>
-          <ac:spMkLst>
-            <pc:docMk/>
-            <pc:sldMk cId="2218816855" sldId="257"/>
-            <ac:spMk id="193" creationId="{42CBB915-5EBB-E82D-9C5B-ED4460CD5775}"/>
-          </ac:spMkLst>
-        </pc:spChg>
-        <pc:spChg chg="del mod">
-          <ac:chgData name="Fatima Pillosu" userId="a6295d4dc9e22643" providerId="LiveId" clId="{87453732-75AC-4426-B5D3-B7C69C2D4F54}" dt="2026-02-03T21:31:06.170" v="70"/>
-          <ac:spMkLst>
-            <pc:docMk/>
-            <pc:sldMk cId="2218816855" sldId="257"/>
-            <ac:spMk id="194" creationId="{EDE12F4D-8488-B16B-1E36-E065F5E9A988}"/>
-          </ac:spMkLst>
-        </pc:spChg>
-        <pc:spChg chg="del">
-          <ac:chgData name="Fatima Pillosu" userId="a6295d4dc9e22643" providerId="LiveId" clId="{87453732-75AC-4426-B5D3-B7C69C2D4F54}" dt="2026-02-03T21:37:06.218" v="428" actId="478"/>
-          <ac:spMkLst>
-            <pc:docMk/>
-            <pc:sldMk cId="2218816855" sldId="257"/>
-            <ac:spMk id="195" creationId="{905FDEB3-CB50-EE6C-23CB-C28ECECDCC8A}"/>
           </ac:spMkLst>
         </pc:spChg>
         <pc:spChg chg="mod">
@@ -1072,15 +392,15 @@
           </ac:grpSpMkLst>
         </pc:grpChg>
         <pc:grpChg chg="add mod">
-          <ac:chgData name="Fatima Pillosu" userId="a6295d4dc9e22643" providerId="LiveId" clId="{87453732-75AC-4426-B5D3-B7C69C2D4F54}" dt="2026-02-03T21:35:42.976" v="425" actId="12788"/>
+          <ac:chgData name="Fatima Pillosu" userId="a6295d4dc9e22643" providerId="LiveId" clId="{87453732-75AC-4426-B5D3-B7C69C2D4F54}" dt="2026-02-08T23:35:39.011" v="1390" actId="12788"/>
           <ac:grpSpMkLst>
             <pc:docMk/>
             <pc:sldMk cId="2218816855" sldId="257"/>
-            <ac:grpSpMk id="4" creationId="{140CF026-A373-E655-10AC-2646F164B4CC}"/>
+            <ac:grpSpMk id="4" creationId="{167F9A27-8BEE-AA41-9E4C-3EA5FC31B243}"/>
           </ac:grpSpMkLst>
         </pc:grpChg>
         <pc:grpChg chg="add mod">
-          <ac:chgData name="Fatima Pillosu" userId="a6295d4dc9e22643" providerId="LiveId" clId="{87453732-75AC-4426-B5D3-B7C69C2D4F54}" dt="2026-02-03T21:55:11.266" v="980" actId="1036"/>
+          <ac:chgData name="Fatima Pillosu" userId="a6295d4dc9e22643" providerId="LiveId" clId="{87453732-75AC-4426-B5D3-B7C69C2D4F54}" dt="2026-02-08T23:35:33.304" v="1389" actId="164"/>
           <ac:grpSpMkLst>
             <pc:docMk/>
             <pc:sldMk cId="2218816855" sldId="257"/>
@@ -1095,88 +415,64 @@
             <ac:grpSpMk id="31" creationId="{B4613E85-52ED-E614-79A7-0E67F45A2EE3}"/>
           </ac:grpSpMkLst>
         </pc:grpChg>
-        <pc:picChg chg="del mod">
-          <ac:chgData name="Fatima Pillosu" userId="a6295d4dc9e22643" providerId="LiveId" clId="{87453732-75AC-4426-B5D3-B7C69C2D4F54}" dt="2026-02-03T21:46:38.764" v="468" actId="478"/>
-          <ac:picMkLst>
+        <pc:graphicFrameChg chg="add mod">
+          <ac:chgData name="Fatima Pillosu" userId="a6295d4dc9e22643" providerId="LiveId" clId="{87453732-75AC-4426-B5D3-B7C69C2D4F54}" dt="2026-02-08T23:40:56.772" v="1392"/>
+          <ac:graphicFrameMkLst>
             <pc:docMk/>
             <pc:sldMk cId="2218816855" sldId="257"/>
-            <ac:picMk id="3" creationId="{C6346ECF-CF2F-0FCC-AF6B-31446FAAD957}"/>
-          </ac:picMkLst>
-        </pc:picChg>
-        <pc:picChg chg="add del mod modCrop">
-          <ac:chgData name="Fatima Pillosu" userId="a6295d4dc9e22643" providerId="LiveId" clId="{87453732-75AC-4426-B5D3-B7C69C2D4F54}" dt="2026-02-03T21:46:59.658" v="473" actId="478"/>
-          <ac:picMkLst>
+            <ac:graphicFrameMk id="6" creationId="{4CDC682F-3F94-4146-A2EA-34FC56D1C20E}"/>
+          </ac:graphicFrameMkLst>
+        </pc:graphicFrameChg>
+        <pc:graphicFrameChg chg="add mod">
+          <ac:chgData name="Fatima Pillosu" userId="a6295d4dc9e22643" providerId="LiveId" clId="{87453732-75AC-4426-B5D3-B7C69C2D4F54}" dt="2026-02-08T23:43:38.519" v="1410"/>
+          <ac:graphicFrameMkLst>
             <pc:docMk/>
             <pc:sldMk cId="2218816855" sldId="257"/>
-            <ac:picMk id="6" creationId="{07DF4242-B7D1-3B86-84E7-3192D7E87FC3}"/>
-          </ac:picMkLst>
-        </pc:picChg>
+            <ac:graphicFrameMk id="13" creationId="{745B198F-933D-68D6-4B72-38129399C344}"/>
+          </ac:graphicFrameMkLst>
+        </pc:graphicFrameChg>
         <pc:picChg chg="add mod">
-          <ac:chgData name="Fatima Pillosu" userId="a6295d4dc9e22643" providerId="LiveId" clId="{87453732-75AC-4426-B5D3-B7C69C2D4F54}" dt="2026-02-03T21:51:19.159" v="780" actId="1038"/>
+          <ac:chgData name="Fatima Pillosu" userId="a6295d4dc9e22643" providerId="LiveId" clId="{87453732-75AC-4426-B5D3-B7C69C2D4F54}" dt="2026-02-08T23:35:39.011" v="1390" actId="12788"/>
           <ac:picMkLst>
             <pc:docMk/>
             <pc:sldMk cId="2218816855" sldId="257"/>
             <ac:picMk id="7" creationId="{B98B29AB-5CAE-F425-4497-EE69D5A4DD38}"/>
           </ac:picMkLst>
         </pc:picChg>
-        <pc:picChg chg="add del mod">
-          <ac:chgData name="Fatima Pillosu" userId="a6295d4dc9e22643" providerId="LiveId" clId="{87453732-75AC-4426-B5D3-B7C69C2D4F54}" dt="2026-02-03T22:03:40.798" v="1221" actId="478"/>
+        <pc:picChg chg="add">
+          <ac:chgData name="Fatima Pillosu" userId="a6295d4dc9e22643" providerId="LiveId" clId="{87453732-75AC-4426-B5D3-B7C69C2D4F54}" dt="2026-02-08T23:41:01.393" v="1393"/>
           <ac:picMkLst>
             <pc:docMk/>
             <pc:sldMk cId="2218816855" sldId="257"/>
-            <ac:picMk id="10" creationId="{1837775D-2112-CF48-8C00-F8FF704E5A2F}"/>
+            <ac:picMk id="8" creationId="{5D9B700C-FFEF-F540-7DCE-AE23EF3C86CA}"/>
           </ac:picMkLst>
         </pc:picChg>
-        <pc:picChg chg="del mod">
-          <ac:chgData name="Fatima Pillosu" userId="a6295d4dc9e22643" providerId="LiveId" clId="{87453732-75AC-4426-B5D3-B7C69C2D4F54}" dt="2026-02-03T21:39:20.493" v="455" actId="478"/>
+        <pc:picChg chg="add del mod">
+          <ac:chgData name="Fatima Pillosu" userId="a6295d4dc9e22643" providerId="LiveId" clId="{87453732-75AC-4426-B5D3-B7C69C2D4F54}" dt="2026-02-08T23:42:44.026" v="1404" actId="478"/>
           <ac:picMkLst>
             <pc:docMk/>
             <pc:sldMk cId="2218816855" sldId="257"/>
-            <ac:picMk id="13" creationId="{75755A78-EC3B-1A85-FDAD-C1BA354A1B76}"/>
+            <ac:picMk id="9" creationId="{0415D1A9-D15C-C1F5-BB20-822A53E1CAC1}"/>
           </ac:picMkLst>
         </pc:picChg>
-        <pc:picChg chg="del mod">
-          <ac:chgData name="Fatima Pillosu" userId="a6295d4dc9e22643" providerId="LiveId" clId="{87453732-75AC-4426-B5D3-B7C69C2D4F54}" dt="2026-02-03T21:39:21.367" v="456" actId="478"/>
+        <pc:picChg chg="add del mod">
+          <ac:chgData name="Fatima Pillosu" userId="a6295d4dc9e22643" providerId="LiveId" clId="{87453732-75AC-4426-B5D3-B7C69C2D4F54}" dt="2026-02-08T23:43:38.048" v="1409" actId="478"/>
           <ac:picMkLst>
             <pc:docMk/>
             <pc:sldMk cId="2218816855" sldId="257"/>
-            <ac:picMk id="15" creationId="{DFCB8D82-1F5F-1C26-7C72-5342C828F7DE}"/>
+            <ac:picMk id="10" creationId="{071B3151-9B28-3BB3-0150-C689B1D3B5D9}"/>
           </ac:picMkLst>
         </pc:picChg>
-        <pc:picChg chg="del mod">
-          <ac:chgData name="Fatima Pillosu" userId="a6295d4dc9e22643" providerId="LiveId" clId="{87453732-75AC-4426-B5D3-B7C69C2D4F54}" dt="2026-02-03T21:39:21.796" v="457" actId="478"/>
+        <pc:picChg chg="add mod">
+          <ac:chgData name="Fatima Pillosu" userId="a6295d4dc9e22643" providerId="LiveId" clId="{87453732-75AC-4426-B5D3-B7C69C2D4F54}" dt="2026-02-08T23:43:53.326" v="1415" actId="1035"/>
           <ac:picMkLst>
             <pc:docMk/>
             <pc:sldMk cId="2218816855" sldId="257"/>
-            <ac:picMk id="21" creationId="{B7A819B0-13FE-7188-3862-31FC802AB7D6}"/>
-          </ac:picMkLst>
-        </pc:picChg>
-        <pc:picChg chg="add del mod">
-          <ac:chgData name="Fatima Pillosu" userId="a6295d4dc9e22643" providerId="LiveId" clId="{87453732-75AC-4426-B5D3-B7C69C2D4F54}" dt="2026-02-03T22:02:47.867" v="1211" actId="478"/>
-          <ac:picMkLst>
-            <pc:docMk/>
-            <pc:sldMk cId="2218816855" sldId="257"/>
-            <ac:picMk id="35" creationId="{4AFD032E-160A-1F7F-856E-BE9F805F6FD0}"/>
-          </ac:picMkLst>
-        </pc:picChg>
-        <pc:picChg chg="add del mod">
-          <ac:chgData name="Fatima Pillosu" userId="a6295d4dc9e22643" providerId="LiveId" clId="{87453732-75AC-4426-B5D3-B7C69C2D4F54}" dt="2026-02-03T22:03:16.846" v="1215" actId="478"/>
-          <ac:picMkLst>
-            <pc:docMk/>
-            <pc:sldMk cId="2218816855" sldId="257"/>
-            <ac:picMk id="36" creationId="{E5E5735D-D4EF-11EA-D948-D4956C49307C}"/>
+            <ac:picMk id="15" creationId="{393B26DB-5663-84F1-6765-6D4068457387}"/>
           </ac:picMkLst>
         </pc:picChg>
         <pc:picChg chg="add del mod ord">
-          <ac:chgData name="Fatima Pillosu" userId="a6295d4dc9e22643" providerId="LiveId" clId="{87453732-75AC-4426-B5D3-B7C69C2D4F54}" dt="2026-02-03T22:15:10.921" v="1250" actId="478"/>
-          <ac:picMkLst>
-            <pc:docMk/>
-            <pc:sldMk cId="2218816855" sldId="257"/>
-            <ac:picMk id="38" creationId="{3C3E9FD0-B1EF-48D6-2873-CBF3C796E322}"/>
-          </ac:picMkLst>
-        </pc:picChg>
-        <pc:picChg chg="add mod ord">
-          <ac:chgData name="Fatima Pillosu" userId="a6295d4dc9e22643" providerId="LiveId" clId="{87453732-75AC-4426-B5D3-B7C69C2D4F54}" dt="2026-02-03T22:15:17.055" v="1251" actId="166"/>
+          <ac:chgData name="Fatima Pillosu" userId="a6295d4dc9e22643" providerId="LiveId" clId="{87453732-75AC-4426-B5D3-B7C69C2D4F54}" dt="2026-02-08T23:41:10.152" v="1395" actId="478"/>
           <ac:picMkLst>
             <pc:docMk/>
             <pc:sldMk cId="2218816855" sldId="257"/>
@@ -1197,354 +493,6 @@
             <pc:docMk/>
             <pc:sldMk cId="2218816855" sldId="257"/>
             <ac:picMk id="203" creationId="{ED551551-B455-F027-D446-B143EC5AE3B0}"/>
-          </ac:picMkLst>
-        </pc:picChg>
-        <pc:picChg chg="del">
-          <ac:chgData name="Fatima Pillosu" userId="a6295d4dc9e22643" providerId="LiveId" clId="{87453732-75AC-4426-B5D3-B7C69C2D4F54}" dt="2026-02-03T21:37:06.218" v="428" actId="478"/>
-          <ac:picMkLst>
-            <pc:docMk/>
-            <pc:sldMk cId="2218816855" sldId="257"/>
-            <ac:picMk id="214" creationId="{E8C12DB0-64D8-B015-07F3-5D26752D9E49}"/>
-          </ac:picMkLst>
-        </pc:picChg>
-        <pc:picChg chg="del">
-          <ac:chgData name="Fatima Pillosu" userId="a6295d4dc9e22643" providerId="LiveId" clId="{87453732-75AC-4426-B5D3-B7C69C2D4F54}" dt="2026-02-03T21:37:06.218" v="428" actId="478"/>
-          <ac:picMkLst>
-            <pc:docMk/>
-            <pc:sldMk cId="2218816855" sldId="257"/>
-            <ac:picMk id="215" creationId="{0DE563AE-41CF-41E0-4795-CDCAD30C16AD}"/>
-          </ac:picMkLst>
-        </pc:picChg>
-        <pc:picChg chg="del">
-          <ac:chgData name="Fatima Pillosu" userId="a6295d4dc9e22643" providerId="LiveId" clId="{87453732-75AC-4426-B5D3-B7C69C2D4F54}" dt="2026-02-03T21:37:06.218" v="428" actId="478"/>
-          <ac:picMkLst>
-            <pc:docMk/>
-            <pc:sldMk cId="2218816855" sldId="257"/>
-            <ac:picMk id="216" creationId="{4944F21A-C6E7-3C15-0D18-6229ADB058F0}"/>
-          </ac:picMkLst>
-        </pc:picChg>
-        <pc:picChg chg="del">
-          <ac:chgData name="Fatima Pillosu" userId="a6295d4dc9e22643" providerId="LiveId" clId="{87453732-75AC-4426-B5D3-B7C69C2D4F54}" dt="2026-02-03T21:37:06.218" v="428" actId="478"/>
-          <ac:picMkLst>
-            <pc:docMk/>
-            <pc:sldMk cId="2218816855" sldId="257"/>
-            <ac:picMk id="217" creationId="{19008543-3B87-7D21-45C2-E2D36BBB0D0E}"/>
-          </ac:picMkLst>
-        </pc:picChg>
-        <pc:picChg chg="del">
-          <ac:chgData name="Fatima Pillosu" userId="a6295d4dc9e22643" providerId="LiveId" clId="{87453732-75AC-4426-B5D3-B7C69C2D4F54}" dt="2026-02-03T21:37:06.218" v="428" actId="478"/>
-          <ac:picMkLst>
-            <pc:docMk/>
-            <pc:sldMk cId="2218816855" sldId="257"/>
-            <ac:picMk id="218" creationId="{4F19FFFC-DAE1-7726-FF5C-BCB20D0970A6}"/>
-          </ac:picMkLst>
-        </pc:picChg>
-        <pc:picChg chg="del">
-          <ac:chgData name="Fatima Pillosu" userId="a6295d4dc9e22643" providerId="LiveId" clId="{87453732-75AC-4426-B5D3-B7C69C2D4F54}" dt="2026-02-03T21:37:06.218" v="428" actId="478"/>
-          <ac:picMkLst>
-            <pc:docMk/>
-            <pc:sldMk cId="2218816855" sldId="257"/>
-            <ac:picMk id="219" creationId="{27739862-CE63-F5F7-0CF5-B33D19D105A1}"/>
-          </ac:picMkLst>
-        </pc:picChg>
-        <pc:picChg chg="del">
-          <ac:chgData name="Fatima Pillosu" userId="a6295d4dc9e22643" providerId="LiveId" clId="{87453732-75AC-4426-B5D3-B7C69C2D4F54}" dt="2026-02-03T21:37:08.869" v="429" actId="478"/>
-          <ac:picMkLst>
-            <pc:docMk/>
-            <pc:sldMk cId="2218816855" sldId="257"/>
-            <ac:picMk id="220" creationId="{FC179E9D-10E6-1DA7-00CE-E4364DCC16AB}"/>
-          </ac:picMkLst>
-        </pc:picChg>
-        <pc:picChg chg="del">
-          <ac:chgData name="Fatima Pillosu" userId="a6295d4dc9e22643" providerId="LiveId" clId="{87453732-75AC-4426-B5D3-B7C69C2D4F54}" dt="2026-02-03T21:37:08.869" v="429" actId="478"/>
-          <ac:picMkLst>
-            <pc:docMk/>
-            <pc:sldMk cId="2218816855" sldId="257"/>
-            <ac:picMk id="221" creationId="{471520D5-C00B-624D-AF5A-A7308270DD9E}"/>
-          </ac:picMkLst>
-        </pc:picChg>
-        <pc:picChg chg="del">
-          <ac:chgData name="Fatima Pillosu" userId="a6295d4dc9e22643" providerId="LiveId" clId="{87453732-75AC-4426-B5D3-B7C69C2D4F54}" dt="2026-02-03T21:37:08.869" v="429" actId="478"/>
-          <ac:picMkLst>
-            <pc:docMk/>
-            <pc:sldMk cId="2218816855" sldId="257"/>
-            <ac:picMk id="222" creationId="{BFDA047B-2145-16B0-430A-42137D88FBB1}"/>
-          </ac:picMkLst>
-        </pc:picChg>
-        <pc:picChg chg="del">
-          <ac:chgData name="Fatima Pillosu" userId="a6295d4dc9e22643" providerId="LiveId" clId="{87453732-75AC-4426-B5D3-B7C69C2D4F54}" dt="2026-02-03T21:37:08.869" v="429" actId="478"/>
-          <ac:picMkLst>
-            <pc:docMk/>
-            <pc:sldMk cId="2218816855" sldId="257"/>
-            <ac:picMk id="223" creationId="{67649283-7216-DB62-1209-65D149692DE0}"/>
-          </ac:picMkLst>
-        </pc:picChg>
-        <pc:picChg chg="del">
-          <ac:chgData name="Fatima Pillosu" userId="a6295d4dc9e22643" providerId="LiveId" clId="{87453732-75AC-4426-B5D3-B7C69C2D4F54}" dt="2026-02-03T21:37:08.869" v="429" actId="478"/>
-          <ac:picMkLst>
-            <pc:docMk/>
-            <pc:sldMk cId="2218816855" sldId="257"/>
-            <ac:picMk id="224" creationId="{3C042D55-1693-B6C1-F9B7-AE31FE3ADA88}"/>
-          </ac:picMkLst>
-        </pc:picChg>
-        <pc:picChg chg="del">
-          <ac:chgData name="Fatima Pillosu" userId="a6295d4dc9e22643" providerId="LiveId" clId="{87453732-75AC-4426-B5D3-B7C69C2D4F54}" dt="2026-02-03T21:37:08.869" v="429" actId="478"/>
-          <ac:picMkLst>
-            <pc:docMk/>
-            <pc:sldMk cId="2218816855" sldId="257"/>
-            <ac:picMk id="225" creationId="{F333E119-A012-ABAE-04C5-37DD42C2D34C}"/>
-          </ac:picMkLst>
-        </pc:picChg>
-        <pc:picChg chg="del">
-          <ac:chgData name="Fatima Pillosu" userId="a6295d4dc9e22643" providerId="LiveId" clId="{87453732-75AC-4426-B5D3-B7C69C2D4F54}" dt="2026-02-03T21:37:15.846" v="431" actId="478"/>
-          <ac:picMkLst>
-            <pc:docMk/>
-            <pc:sldMk cId="2218816855" sldId="257"/>
-            <ac:picMk id="226" creationId="{6D784AD1-D841-1F46-5ED0-96AF0B05170A}"/>
-          </ac:picMkLst>
-        </pc:picChg>
-        <pc:picChg chg="del">
-          <ac:chgData name="Fatima Pillosu" userId="a6295d4dc9e22643" providerId="LiveId" clId="{87453732-75AC-4426-B5D3-B7C69C2D4F54}" dt="2026-02-03T21:37:15.846" v="431" actId="478"/>
-          <ac:picMkLst>
-            <pc:docMk/>
-            <pc:sldMk cId="2218816855" sldId="257"/>
-            <ac:picMk id="227" creationId="{D6F9C0FB-0D5D-7521-6288-E8F832371298}"/>
-          </ac:picMkLst>
-        </pc:picChg>
-        <pc:picChg chg="del">
-          <ac:chgData name="Fatima Pillosu" userId="a6295d4dc9e22643" providerId="LiveId" clId="{87453732-75AC-4426-B5D3-B7C69C2D4F54}" dt="2026-02-03T21:37:15.846" v="431" actId="478"/>
-          <ac:picMkLst>
-            <pc:docMk/>
-            <pc:sldMk cId="2218816855" sldId="257"/>
-            <ac:picMk id="228" creationId="{C962BC04-1FEF-A078-0EFD-EB90BCD75B26}"/>
-          </ac:picMkLst>
-        </pc:picChg>
-        <pc:picChg chg="del">
-          <ac:chgData name="Fatima Pillosu" userId="a6295d4dc9e22643" providerId="LiveId" clId="{87453732-75AC-4426-B5D3-B7C69C2D4F54}" dt="2026-02-03T21:37:15.846" v="431" actId="478"/>
-          <ac:picMkLst>
-            <pc:docMk/>
-            <pc:sldMk cId="2218816855" sldId="257"/>
-            <ac:picMk id="229" creationId="{5161AB38-92A8-494B-A337-F0A75D847C0E}"/>
-          </ac:picMkLst>
-        </pc:picChg>
-        <pc:picChg chg="del">
-          <ac:chgData name="Fatima Pillosu" userId="a6295d4dc9e22643" providerId="LiveId" clId="{87453732-75AC-4426-B5D3-B7C69C2D4F54}" dt="2026-02-03T21:37:15.846" v="431" actId="478"/>
-          <ac:picMkLst>
-            <pc:docMk/>
-            <pc:sldMk cId="2218816855" sldId="257"/>
-            <ac:picMk id="230" creationId="{0DDED44C-295A-F3C8-306A-0CD9A743E184}"/>
-          </ac:picMkLst>
-        </pc:picChg>
-        <pc:picChg chg="del">
-          <ac:chgData name="Fatima Pillosu" userId="a6295d4dc9e22643" providerId="LiveId" clId="{87453732-75AC-4426-B5D3-B7C69C2D4F54}" dt="2026-02-03T21:37:15.846" v="431" actId="478"/>
-          <ac:picMkLst>
-            <pc:docMk/>
-            <pc:sldMk cId="2218816855" sldId="257"/>
-            <ac:picMk id="231" creationId="{1CD7A0A4-6705-DD82-E63D-FA3AC385B12B}"/>
-          </ac:picMkLst>
-        </pc:picChg>
-        <pc:picChg chg="del">
-          <ac:chgData name="Fatima Pillosu" userId="a6295d4dc9e22643" providerId="LiveId" clId="{87453732-75AC-4426-B5D3-B7C69C2D4F54}" dt="2026-02-03T21:37:12.314" v="430" actId="478"/>
-          <ac:picMkLst>
-            <pc:docMk/>
-            <pc:sldMk cId="2218816855" sldId="257"/>
-            <ac:picMk id="232" creationId="{98DB7F3E-BEFC-2EBE-987D-088AC04390F8}"/>
-          </ac:picMkLst>
-        </pc:picChg>
-        <pc:picChg chg="del">
-          <ac:chgData name="Fatima Pillosu" userId="a6295d4dc9e22643" providerId="LiveId" clId="{87453732-75AC-4426-B5D3-B7C69C2D4F54}" dt="2026-02-03T21:37:12.314" v="430" actId="478"/>
-          <ac:picMkLst>
-            <pc:docMk/>
-            <pc:sldMk cId="2218816855" sldId="257"/>
-            <ac:picMk id="233" creationId="{C2852909-55E9-D63A-FDB1-308D13B17017}"/>
-          </ac:picMkLst>
-        </pc:picChg>
-        <pc:picChg chg="del">
-          <ac:chgData name="Fatima Pillosu" userId="a6295d4dc9e22643" providerId="LiveId" clId="{87453732-75AC-4426-B5D3-B7C69C2D4F54}" dt="2026-02-03T21:37:12.314" v="430" actId="478"/>
-          <ac:picMkLst>
-            <pc:docMk/>
-            <pc:sldMk cId="2218816855" sldId="257"/>
-            <ac:picMk id="234" creationId="{520EA3C2-C510-E465-CA00-3D4EEA4BAB7E}"/>
-          </ac:picMkLst>
-        </pc:picChg>
-        <pc:picChg chg="del">
-          <ac:chgData name="Fatima Pillosu" userId="a6295d4dc9e22643" providerId="LiveId" clId="{87453732-75AC-4426-B5D3-B7C69C2D4F54}" dt="2026-02-03T21:37:12.314" v="430" actId="478"/>
-          <ac:picMkLst>
-            <pc:docMk/>
-            <pc:sldMk cId="2218816855" sldId="257"/>
-            <ac:picMk id="235" creationId="{D012BD6C-DF03-652C-0E00-7290054B08A4}"/>
-          </ac:picMkLst>
-        </pc:picChg>
-        <pc:picChg chg="del">
-          <ac:chgData name="Fatima Pillosu" userId="a6295d4dc9e22643" providerId="LiveId" clId="{87453732-75AC-4426-B5D3-B7C69C2D4F54}" dt="2026-02-03T21:37:12.314" v="430" actId="478"/>
-          <ac:picMkLst>
-            <pc:docMk/>
-            <pc:sldMk cId="2218816855" sldId="257"/>
-            <ac:picMk id="236" creationId="{6D793659-7441-416E-4012-165A0457200D}"/>
-          </ac:picMkLst>
-        </pc:picChg>
-        <pc:picChg chg="del">
-          <ac:chgData name="Fatima Pillosu" userId="a6295d4dc9e22643" providerId="LiveId" clId="{87453732-75AC-4426-B5D3-B7C69C2D4F54}" dt="2026-02-03T21:37:12.314" v="430" actId="478"/>
-          <ac:picMkLst>
-            <pc:docMk/>
-            <pc:sldMk cId="2218816855" sldId="257"/>
-            <ac:picMk id="237" creationId="{34EC6B45-C490-3347-7F83-FBCD6AC79742}"/>
-          </ac:picMkLst>
-        </pc:picChg>
-      </pc:sldChg>
-      <pc:sldChg chg="add del">
-        <pc:chgData name="Fatima Pillosu" userId="a6295d4dc9e22643" providerId="LiveId" clId="{87453732-75AC-4426-B5D3-B7C69C2D4F54}" dt="2026-02-03T21:27:24.841" v="23" actId="47"/>
-        <pc:sldMkLst>
-          <pc:docMk/>
-          <pc:sldMk cId="3275577984" sldId="257"/>
-        </pc:sldMkLst>
-      </pc:sldChg>
-      <pc:sldChg chg="addSp delSp modSp add del mod">
-        <pc:chgData name="Fatima Pillosu" userId="a6295d4dc9e22643" providerId="LiveId" clId="{87453732-75AC-4426-B5D3-B7C69C2D4F54}" dt="2026-02-03T22:28:49.921" v="1377" actId="47"/>
-        <pc:sldMkLst>
-          <pc:docMk/>
-          <pc:sldMk cId="2430694615" sldId="258"/>
-        </pc:sldMkLst>
-        <pc:spChg chg="add del">
-          <ac:chgData name="Fatima Pillosu" userId="a6295d4dc9e22643" providerId="LiveId" clId="{87453732-75AC-4426-B5D3-B7C69C2D4F54}" dt="2026-02-03T22:14:01.730" v="1237" actId="22"/>
-          <ac:spMkLst>
-            <pc:docMk/>
-            <pc:sldMk cId="2430694615" sldId="258"/>
-            <ac:spMk id="6" creationId="{C4895162-AA8F-DBD1-FE28-3D6A8DF0E302}"/>
-          </ac:spMkLst>
-        </pc:spChg>
-        <pc:spChg chg="mod">
-          <ac:chgData name="Fatima Pillosu" userId="a6295d4dc9e22643" providerId="LiveId" clId="{87453732-75AC-4426-B5D3-B7C69C2D4F54}" dt="2026-02-03T22:17:22.334" v="1311" actId="20577"/>
-          <ac:spMkLst>
-            <pc:docMk/>
-            <pc:sldMk cId="2430694615" sldId="258"/>
-            <ac:spMk id="139" creationId="{598950A2-0AFC-A5B2-60EC-9656696513B7}"/>
-          </ac:spMkLst>
-        </pc:spChg>
-        <pc:picChg chg="add mod ord">
-          <ac:chgData name="Fatima Pillosu" userId="a6295d4dc9e22643" providerId="LiveId" clId="{87453732-75AC-4426-B5D3-B7C69C2D4F54}" dt="2026-02-03T22:13:05.051" v="1229" actId="167"/>
-          <ac:picMkLst>
-            <pc:docMk/>
-            <pc:sldMk cId="2430694615" sldId="258"/>
-            <ac:picMk id="3" creationId="{17ED43EF-8965-444B-DA11-14D363E0E125}"/>
-          </ac:picMkLst>
-        </pc:picChg>
-        <pc:picChg chg="del mod">
-          <ac:chgData name="Fatima Pillosu" userId="a6295d4dc9e22643" providerId="LiveId" clId="{87453732-75AC-4426-B5D3-B7C69C2D4F54}" dt="2026-02-03T22:13:07.386" v="1230" actId="478"/>
-          <ac:picMkLst>
-            <pc:docMk/>
-            <pc:sldMk cId="2430694615" sldId="258"/>
-            <ac:picMk id="7" creationId="{775F092C-8C9D-219E-20CB-75918E2B31FD}"/>
-          </ac:picMkLst>
-        </pc:picChg>
-        <pc:picChg chg="add mod ord">
-          <ac:chgData name="Fatima Pillosu" userId="a6295d4dc9e22643" providerId="LiveId" clId="{87453732-75AC-4426-B5D3-B7C69C2D4F54}" dt="2026-02-03T22:14:28.332" v="1244" actId="166"/>
-          <ac:picMkLst>
-            <pc:docMk/>
-            <pc:sldMk cId="2430694615" sldId="258"/>
-            <ac:picMk id="8" creationId="{1E389096-59F4-01EE-75E2-FD097E3708BD}"/>
-          </ac:picMkLst>
-        </pc:picChg>
-        <pc:picChg chg="del mod">
-          <ac:chgData name="Fatima Pillosu" userId="a6295d4dc9e22643" providerId="LiveId" clId="{87453732-75AC-4426-B5D3-B7C69C2D4F54}" dt="2026-02-03T22:14:23.193" v="1243" actId="478"/>
-          <ac:picMkLst>
-            <pc:docMk/>
-            <pc:sldMk cId="2430694615" sldId="258"/>
-            <ac:picMk id="38" creationId="{EC7FA316-896B-840F-E92B-A26C0C12F6DE}"/>
-          </ac:picMkLst>
-        </pc:picChg>
-      </pc:sldChg>
-      <pc:sldChg chg="addSp delSp modSp add del mod">
-        <pc:chgData name="Fatima Pillosu" userId="a6295d4dc9e22643" providerId="LiveId" clId="{87453732-75AC-4426-B5D3-B7C69C2D4F54}" dt="2026-02-03T22:28:49.921" v="1377" actId="47"/>
-        <pc:sldMkLst>
-          <pc:docMk/>
-          <pc:sldMk cId="3081413607" sldId="259"/>
-        </pc:sldMkLst>
-        <pc:spChg chg="mod">
-          <ac:chgData name="Fatima Pillosu" userId="a6295d4dc9e22643" providerId="LiveId" clId="{87453732-75AC-4426-B5D3-B7C69C2D4F54}" dt="2026-02-03T22:17:15.426" v="1303" actId="20577"/>
-          <ac:spMkLst>
-            <pc:docMk/>
-            <pc:sldMk cId="3081413607" sldId="259"/>
-            <ac:spMk id="139" creationId="{61DB31CB-6F29-BDDB-00CC-3A55EEB9D7DF}"/>
-          </ac:spMkLst>
-        </pc:spChg>
-        <pc:picChg chg="add del mod">
-          <ac:chgData name="Fatima Pillosu" userId="a6295d4dc9e22643" providerId="LiveId" clId="{87453732-75AC-4426-B5D3-B7C69C2D4F54}" dt="2026-02-03T22:16:40.571" v="1260" actId="478"/>
-          <ac:picMkLst>
-            <pc:docMk/>
-            <pc:sldMk cId="3081413607" sldId="259"/>
-            <ac:picMk id="3" creationId="{7AF77220-2F69-DA8B-61B3-B7169736E138}"/>
-          </ac:picMkLst>
-        </pc:picChg>
-        <pc:picChg chg="add mod ord">
-          <ac:chgData name="Fatima Pillosu" userId="a6295d4dc9e22643" providerId="LiveId" clId="{87453732-75AC-4426-B5D3-B7C69C2D4F54}" dt="2026-02-03T22:16:38.645" v="1259" actId="167"/>
-          <ac:picMkLst>
-            <pc:docMk/>
-            <pc:sldMk cId="3081413607" sldId="259"/>
-            <ac:picMk id="4" creationId="{B6534C42-605F-567D-44D6-DF7BE4EE44B7}"/>
-          </ac:picMkLst>
-        </pc:picChg>
-        <pc:picChg chg="add mod ord">
-          <ac:chgData name="Fatima Pillosu" userId="a6295d4dc9e22643" providerId="LiveId" clId="{87453732-75AC-4426-B5D3-B7C69C2D4F54}" dt="2026-02-03T22:18:32.530" v="1326" actId="166"/>
-          <ac:picMkLst>
-            <pc:docMk/>
-            <pc:sldMk cId="3081413607" sldId="259"/>
-            <ac:picMk id="6" creationId="{D0967105-9236-EC17-4944-8786D54BAAB5}"/>
-          </ac:picMkLst>
-        </pc:picChg>
-        <pc:picChg chg="del mod">
-          <ac:chgData name="Fatima Pillosu" userId="a6295d4dc9e22643" providerId="LiveId" clId="{87453732-75AC-4426-B5D3-B7C69C2D4F54}" dt="2026-02-03T22:18:28.808" v="1325" actId="478"/>
-          <ac:picMkLst>
-            <pc:docMk/>
-            <pc:sldMk cId="3081413607" sldId="259"/>
-            <ac:picMk id="8" creationId="{843E6D9E-6EB4-AF28-7F28-EA192B1DDE5D}"/>
-          </ac:picMkLst>
-        </pc:picChg>
-      </pc:sldChg>
-      <pc:sldChg chg="addSp delSp modSp add del mod">
-        <pc:chgData name="Fatima Pillosu" userId="a6295d4dc9e22643" providerId="LiveId" clId="{87453732-75AC-4426-B5D3-B7C69C2D4F54}" dt="2026-02-03T22:28:49.921" v="1377" actId="47"/>
-        <pc:sldMkLst>
-          <pc:docMk/>
-          <pc:sldMk cId="198537044" sldId="260"/>
-        </pc:sldMkLst>
-        <pc:spChg chg="mod">
-          <ac:chgData name="Fatima Pillosu" userId="a6295d4dc9e22643" providerId="LiveId" clId="{87453732-75AC-4426-B5D3-B7C69C2D4F54}" dt="2026-02-03T22:20:01.505" v="1362" actId="6549"/>
-          <ac:spMkLst>
-            <pc:docMk/>
-            <pc:sldMk cId="198537044" sldId="260"/>
-            <ac:spMk id="139" creationId="{2F41C470-DB45-05CD-6E3A-7C6A41FB87DB}"/>
-          </ac:spMkLst>
-        </pc:spChg>
-        <pc:picChg chg="add mod ord">
-          <ac:chgData name="Fatima Pillosu" userId="a6295d4dc9e22643" providerId="LiveId" clId="{87453732-75AC-4426-B5D3-B7C69C2D4F54}" dt="2026-02-03T22:20:34.410" v="1367" actId="167"/>
-          <ac:picMkLst>
-            <pc:docMk/>
-            <pc:sldMk cId="198537044" sldId="260"/>
-            <ac:picMk id="3" creationId="{02492B6A-E250-1D67-A0F5-3E3C4E293F79}"/>
-          </ac:picMkLst>
-        </pc:picChg>
-        <pc:picChg chg="del mod">
-          <ac:chgData name="Fatima Pillosu" userId="a6295d4dc9e22643" providerId="LiveId" clId="{87453732-75AC-4426-B5D3-B7C69C2D4F54}" dt="2026-02-03T22:20:36.017" v="1368" actId="478"/>
-          <ac:picMkLst>
-            <pc:docMk/>
-            <pc:sldMk cId="198537044" sldId="260"/>
-            <ac:picMk id="4" creationId="{A64E56A0-958C-E46B-7ABD-04DE28AA15A1}"/>
-          </ac:picMkLst>
-        </pc:picChg>
-        <pc:picChg chg="del mod">
-          <ac:chgData name="Fatima Pillosu" userId="a6295d4dc9e22643" providerId="LiveId" clId="{87453732-75AC-4426-B5D3-B7C69C2D4F54}" dt="2026-02-03T22:21:04.462" v="1374" actId="478"/>
-          <ac:picMkLst>
-            <pc:docMk/>
-            <pc:sldMk cId="198537044" sldId="260"/>
-            <ac:picMk id="6" creationId="{654CC1B7-D3B9-373D-74A6-D900B4CFB8C0}"/>
-          </ac:picMkLst>
-        </pc:picChg>
-        <pc:picChg chg="add mod ord">
-          <ac:chgData name="Fatima Pillosu" userId="a6295d4dc9e22643" providerId="LiveId" clId="{87453732-75AC-4426-B5D3-B7C69C2D4F54}" dt="2026-02-03T22:21:07.473" v="1375" actId="166"/>
-          <ac:picMkLst>
-            <pc:docMk/>
-            <pc:sldMk cId="198537044" sldId="260"/>
-            <ac:picMk id="7" creationId="{C3FCABF2-5CFE-D93B-74EC-3ED528DC0350}"/>
           </ac:picMkLst>
         </pc:picChg>
       </pc:sldChg>
@@ -1684,7 +632,7 @@
           <a:p>
             <a:fld id="{EEABE760-A251-43BA-A244-B50DF713F3AF}" type="datetimeFigureOut">
               <a:rPr lang="en-GB" smtClean="0"/>
-              <a:t>03/02/2026</a:t>
+              <a:t>08/02/2026</a:t>
             </a:fld>
             <a:endParaRPr lang="en-GB"/>
           </a:p>
@@ -1854,7 +802,7 @@
           <a:p>
             <a:fld id="{EEABE760-A251-43BA-A244-B50DF713F3AF}" type="datetimeFigureOut">
               <a:rPr lang="en-GB" smtClean="0"/>
-              <a:t>03/02/2026</a:t>
+              <a:t>08/02/2026</a:t>
             </a:fld>
             <a:endParaRPr lang="en-GB"/>
           </a:p>
@@ -2034,7 +982,7 @@
           <a:p>
             <a:fld id="{EEABE760-A251-43BA-A244-B50DF713F3AF}" type="datetimeFigureOut">
               <a:rPr lang="en-GB" smtClean="0"/>
-              <a:t>03/02/2026</a:t>
+              <a:t>08/02/2026</a:t>
             </a:fld>
             <a:endParaRPr lang="en-GB"/>
           </a:p>
@@ -2204,7 +1152,7 @@
           <a:p>
             <a:fld id="{EEABE760-A251-43BA-A244-B50DF713F3AF}" type="datetimeFigureOut">
               <a:rPr lang="en-GB" smtClean="0"/>
-              <a:t>03/02/2026</a:t>
+              <a:t>08/02/2026</a:t>
             </a:fld>
             <a:endParaRPr lang="en-GB"/>
           </a:p>
@@ -2448,7 +1396,7 @@
           <a:p>
             <a:fld id="{EEABE760-A251-43BA-A244-B50DF713F3AF}" type="datetimeFigureOut">
               <a:rPr lang="en-GB" smtClean="0"/>
-              <a:t>03/02/2026</a:t>
+              <a:t>08/02/2026</a:t>
             </a:fld>
             <a:endParaRPr lang="en-GB"/>
           </a:p>
@@ -2680,7 +1628,7 @@
           <a:p>
             <a:fld id="{EEABE760-A251-43BA-A244-B50DF713F3AF}" type="datetimeFigureOut">
               <a:rPr lang="en-GB" smtClean="0"/>
-              <a:t>03/02/2026</a:t>
+              <a:t>08/02/2026</a:t>
             </a:fld>
             <a:endParaRPr lang="en-GB"/>
           </a:p>
@@ -3047,7 +1995,7 @@
           <a:p>
             <a:fld id="{EEABE760-A251-43BA-A244-B50DF713F3AF}" type="datetimeFigureOut">
               <a:rPr lang="en-GB" smtClean="0"/>
-              <a:t>03/02/2026</a:t>
+              <a:t>08/02/2026</a:t>
             </a:fld>
             <a:endParaRPr lang="en-GB"/>
           </a:p>
@@ -3165,7 +2113,7 @@
           <a:p>
             <a:fld id="{EEABE760-A251-43BA-A244-B50DF713F3AF}" type="datetimeFigureOut">
               <a:rPr lang="en-GB" smtClean="0"/>
-              <a:t>03/02/2026</a:t>
+              <a:t>08/02/2026</a:t>
             </a:fld>
             <a:endParaRPr lang="en-GB"/>
           </a:p>
@@ -3260,7 +2208,7 @@
           <a:p>
             <a:fld id="{EEABE760-A251-43BA-A244-B50DF713F3AF}" type="datetimeFigureOut">
               <a:rPr lang="en-GB" smtClean="0"/>
-              <a:t>03/02/2026</a:t>
+              <a:t>08/02/2026</a:t>
             </a:fld>
             <a:endParaRPr lang="en-GB"/>
           </a:p>
@@ -3537,7 +2485,7 @@
           <a:p>
             <a:fld id="{EEABE760-A251-43BA-A244-B50DF713F3AF}" type="datetimeFigureOut">
               <a:rPr lang="en-GB" smtClean="0"/>
-              <a:t>03/02/2026</a:t>
+              <a:t>08/02/2026</a:t>
             </a:fld>
             <a:endParaRPr lang="en-GB"/>
           </a:p>
@@ -3794,7 +2742,7 @@
           <a:p>
             <a:fld id="{EEABE760-A251-43BA-A244-B50DF713F3AF}" type="datetimeFigureOut">
               <a:rPr lang="en-GB" smtClean="0"/>
-              <a:t>03/02/2026</a:t>
+              <a:t>08/02/2026</a:t>
             </a:fld>
             <a:endParaRPr lang="en-GB"/>
           </a:p>
@@ -4007,7 +2955,7 @@
           <a:p>
             <a:fld id="{EEABE760-A251-43BA-A244-B50DF713F3AF}" type="datetimeFigureOut">
               <a:rPr lang="en-GB" smtClean="0"/>
-              <a:t>03/02/2026</a:t>
+              <a:t>08/02/2026</a:t>
             </a:fld>
             <a:endParaRPr lang="en-GB"/>
           </a:p>
@@ -4877,362 +3825,6 @@
       </p:sp>
       <p:grpSp>
         <p:nvGrpSpPr>
-          <p:cNvPr id="5" name="Group 4">
-            <a:extLst>
-              <a:ext uri="{FF2B5EF4-FFF2-40B4-BE49-F238E27FC236}">
-                <a16:creationId xmlns:a16="http://schemas.microsoft.com/office/drawing/2014/main" id="{37C00166-9583-C38F-69EE-1C603FE82112}"/>
-              </a:ext>
-            </a:extLst>
-          </p:cNvPr>
-          <p:cNvGrpSpPr/>
-          <p:nvPr/>
-        </p:nvGrpSpPr>
-        <p:grpSpPr>
-          <a:xfrm>
-            <a:off x="865097" y="1933146"/>
-            <a:ext cx="4563362" cy="324080"/>
-            <a:chOff x="781948" y="1625195"/>
-            <a:chExt cx="4563362" cy="324080"/>
-          </a:xfrm>
-        </p:grpSpPr>
-        <p:sp>
-          <p:nvSpPr>
-            <p:cNvPr id="196" name="TextBox 195">
-              <a:extLst>
-                <a:ext uri="{FF2B5EF4-FFF2-40B4-BE49-F238E27FC236}">
-                  <a16:creationId xmlns:a16="http://schemas.microsoft.com/office/drawing/2014/main" id="{7CC1A3FA-0C4D-565E-6E06-A7B7B6B3F72D}"/>
-                </a:ext>
-              </a:extLst>
-            </p:cNvPr>
-            <p:cNvSpPr txBox="1"/>
-            <p:nvPr/>
-          </p:nvSpPr>
-          <p:spPr>
-            <a:xfrm>
-              <a:off x="781948" y="1625195"/>
-              <a:ext cx="239168" cy="215444"/>
-            </a:xfrm>
-            <a:prstGeom prst="rect">
-              <a:avLst/>
-            </a:prstGeom>
-            <a:noFill/>
-          </p:spPr>
-          <p:txBody>
-            <a:bodyPr wrap="none" rtlCol="0">
-              <a:spAutoFit/>
-            </a:bodyPr>
-            <a:lstStyle/>
-            <a:p>
-              <a:pPr algn="r"/>
-              <a:r>
-                <a:rPr lang="en-US" sz="800" dirty="0">
-                  <a:solidFill>
-                    <a:schemeClr val="tx1">
-                      <a:lumMod val="85000"/>
-                      <a:lumOff val="15000"/>
-                    </a:schemeClr>
-                  </a:solidFill>
-                  <a:latin typeface="Aptos" panose="020B0004020202020204" pitchFamily="34" charset="0"/>
-                </a:rPr>
-                <a:t>0</a:t>
-              </a:r>
-              <a:endParaRPr lang="en-GB" sz="800" dirty="0">
-                <a:solidFill>
-                  <a:schemeClr val="tx1">
-                    <a:lumMod val="85000"/>
-                    <a:lumOff val="15000"/>
-                  </a:schemeClr>
-                </a:solidFill>
-                <a:latin typeface="Aptos" panose="020B0004020202020204" pitchFamily="34" charset="0"/>
-              </a:endParaRPr>
-            </a:p>
-          </p:txBody>
-        </p:sp>
-        <p:sp>
-          <p:nvSpPr>
-            <p:cNvPr id="197" name="TextBox 196">
-              <a:extLst>
-                <a:ext uri="{FF2B5EF4-FFF2-40B4-BE49-F238E27FC236}">
-                  <a16:creationId xmlns:a16="http://schemas.microsoft.com/office/drawing/2014/main" id="{BD520B40-6521-7067-06E6-DBF62B29380D}"/>
-                </a:ext>
-              </a:extLst>
-            </p:cNvPr>
-            <p:cNvSpPr txBox="1"/>
-            <p:nvPr/>
-          </p:nvSpPr>
-          <p:spPr>
-            <a:xfrm>
-              <a:off x="1560889" y="1625195"/>
-              <a:ext cx="322525" cy="215444"/>
-            </a:xfrm>
-            <a:prstGeom prst="rect">
-              <a:avLst/>
-            </a:prstGeom>
-            <a:noFill/>
-          </p:spPr>
-          <p:txBody>
-            <a:bodyPr wrap="none" rtlCol="0">
-              <a:spAutoFit/>
-            </a:bodyPr>
-            <a:lstStyle/>
-            <a:p>
-              <a:pPr algn="r"/>
-              <a:r>
-                <a:rPr lang="en-US" sz="800" dirty="0">
-                  <a:solidFill>
-                    <a:schemeClr val="tx1">
-                      <a:lumMod val="85000"/>
-                      <a:lumOff val="15000"/>
-                    </a:schemeClr>
-                  </a:solidFill>
-                  <a:latin typeface="Aptos" panose="020B0004020202020204" pitchFamily="34" charset="0"/>
-                </a:rPr>
-                <a:t>0.1</a:t>
-              </a:r>
-              <a:endParaRPr lang="en-GB" sz="800" dirty="0">
-                <a:solidFill>
-                  <a:schemeClr val="tx1">
-                    <a:lumMod val="85000"/>
-                    <a:lumOff val="15000"/>
-                  </a:schemeClr>
-                </a:solidFill>
-                <a:latin typeface="Aptos" panose="020B0004020202020204" pitchFamily="34" charset="0"/>
-              </a:endParaRPr>
-            </a:p>
-          </p:txBody>
-        </p:sp>
-        <p:sp>
-          <p:nvSpPr>
-            <p:cNvPr id="198" name="TextBox 197">
-              <a:extLst>
-                <a:ext uri="{FF2B5EF4-FFF2-40B4-BE49-F238E27FC236}">
-                  <a16:creationId xmlns:a16="http://schemas.microsoft.com/office/drawing/2014/main" id="{425B0BD8-56D6-6BEF-F39D-51F09284C9F8}"/>
-                </a:ext>
-              </a:extLst>
-            </p:cNvPr>
-            <p:cNvSpPr txBox="1"/>
-            <p:nvPr/>
-          </p:nvSpPr>
-          <p:spPr>
-            <a:xfrm>
-              <a:off x="2388727" y="1625195"/>
-              <a:ext cx="322525" cy="215444"/>
-            </a:xfrm>
-            <a:prstGeom prst="rect">
-              <a:avLst/>
-            </a:prstGeom>
-            <a:noFill/>
-          </p:spPr>
-          <p:txBody>
-            <a:bodyPr wrap="none" rtlCol="0">
-              <a:spAutoFit/>
-            </a:bodyPr>
-            <a:lstStyle/>
-            <a:p>
-              <a:pPr algn="r"/>
-              <a:r>
-                <a:rPr lang="en-US" sz="800" dirty="0">
-                  <a:solidFill>
-                    <a:schemeClr val="tx1">
-                      <a:lumMod val="85000"/>
-                      <a:lumOff val="15000"/>
-                    </a:schemeClr>
-                  </a:solidFill>
-                  <a:latin typeface="Aptos" panose="020B0004020202020204" pitchFamily="34" charset="0"/>
-                </a:rPr>
-                <a:t>0.3</a:t>
-              </a:r>
-            </a:p>
-          </p:txBody>
-        </p:sp>
-        <p:sp>
-          <p:nvSpPr>
-            <p:cNvPr id="199" name="TextBox 198">
-              <a:extLst>
-                <a:ext uri="{FF2B5EF4-FFF2-40B4-BE49-F238E27FC236}">
-                  <a16:creationId xmlns:a16="http://schemas.microsoft.com/office/drawing/2014/main" id="{B29B6A8F-84C1-93E5-25DA-FD9E21561492}"/>
-                </a:ext>
-              </a:extLst>
-            </p:cNvPr>
-            <p:cNvSpPr txBox="1"/>
-            <p:nvPr/>
-          </p:nvSpPr>
-          <p:spPr>
-            <a:xfrm>
-              <a:off x="3240196" y="1625195"/>
-              <a:ext cx="322525" cy="215444"/>
-            </a:xfrm>
-            <a:prstGeom prst="rect">
-              <a:avLst/>
-            </a:prstGeom>
-            <a:noFill/>
-          </p:spPr>
-          <p:txBody>
-            <a:bodyPr wrap="none" rtlCol="0">
-              <a:spAutoFit/>
-            </a:bodyPr>
-            <a:lstStyle/>
-            <a:p>
-              <a:pPr algn="r"/>
-              <a:r>
-                <a:rPr lang="en-US" sz="800" dirty="0">
-                  <a:solidFill>
-                    <a:schemeClr val="tx1">
-                      <a:lumMod val="85000"/>
-                      <a:lumOff val="15000"/>
-                    </a:schemeClr>
-                  </a:solidFill>
-                  <a:latin typeface="Aptos" panose="020B0004020202020204" pitchFamily="34" charset="0"/>
-                </a:rPr>
-                <a:t>0.5</a:t>
-              </a:r>
-              <a:endParaRPr lang="en-GB" sz="800" dirty="0">
-                <a:solidFill>
-                  <a:schemeClr val="tx1">
-                    <a:lumMod val="85000"/>
-                    <a:lumOff val="15000"/>
-                  </a:schemeClr>
-                </a:solidFill>
-                <a:latin typeface="Aptos" panose="020B0004020202020204" pitchFamily="34" charset="0"/>
-              </a:endParaRPr>
-            </a:p>
-          </p:txBody>
-        </p:sp>
-        <p:sp>
-          <p:nvSpPr>
-            <p:cNvPr id="200" name="TextBox 199">
-              <a:extLst>
-                <a:ext uri="{FF2B5EF4-FFF2-40B4-BE49-F238E27FC236}">
-                  <a16:creationId xmlns:a16="http://schemas.microsoft.com/office/drawing/2014/main" id="{7C1BD1C6-2C2C-5E2E-B681-1FD01FB1AFF0}"/>
-                </a:ext>
-              </a:extLst>
-            </p:cNvPr>
-            <p:cNvSpPr txBox="1"/>
-            <p:nvPr/>
-          </p:nvSpPr>
-          <p:spPr>
-            <a:xfrm>
-              <a:off x="4117248" y="1625195"/>
-              <a:ext cx="239168" cy="215444"/>
-            </a:xfrm>
-            <a:prstGeom prst="rect">
-              <a:avLst/>
-            </a:prstGeom>
-            <a:noFill/>
-          </p:spPr>
-          <p:txBody>
-            <a:bodyPr wrap="none" rtlCol="0">
-              <a:spAutoFit/>
-            </a:bodyPr>
-            <a:lstStyle/>
-            <a:p>
-              <a:pPr algn="r"/>
-              <a:r>
-                <a:rPr lang="en-US" sz="800" dirty="0">
-                  <a:solidFill>
-                    <a:schemeClr val="tx1">
-                      <a:lumMod val="85000"/>
-                      <a:lumOff val="15000"/>
-                    </a:schemeClr>
-                  </a:solidFill>
-                  <a:latin typeface="Aptos" panose="020B0004020202020204" pitchFamily="34" charset="0"/>
-                </a:rPr>
-                <a:t>1</a:t>
-              </a:r>
-              <a:endParaRPr lang="en-GB" sz="800" dirty="0">
-                <a:solidFill>
-                  <a:schemeClr val="tx1">
-                    <a:lumMod val="85000"/>
-                    <a:lumOff val="15000"/>
-                  </a:schemeClr>
-                </a:solidFill>
-                <a:latin typeface="Aptos" panose="020B0004020202020204" pitchFamily="34" charset="0"/>
-              </a:endParaRPr>
-            </a:p>
-          </p:txBody>
-        </p:sp>
-        <p:sp>
-          <p:nvSpPr>
-            <p:cNvPr id="201" name="TextBox 200">
-              <a:extLst>
-                <a:ext uri="{FF2B5EF4-FFF2-40B4-BE49-F238E27FC236}">
-                  <a16:creationId xmlns:a16="http://schemas.microsoft.com/office/drawing/2014/main" id="{7A7E2A95-510C-C0AA-20A4-4BB5662FBF0D}"/>
-                </a:ext>
-              </a:extLst>
-            </p:cNvPr>
-            <p:cNvSpPr txBox="1"/>
-            <p:nvPr/>
-          </p:nvSpPr>
-          <p:spPr>
-            <a:xfrm>
-              <a:off x="4880118" y="1625195"/>
-              <a:ext cx="465192" cy="215444"/>
-            </a:xfrm>
-            <a:prstGeom prst="rect">
-              <a:avLst/>
-            </a:prstGeom>
-            <a:noFill/>
-          </p:spPr>
-          <p:txBody>
-            <a:bodyPr wrap="none" rtlCol="0">
-              <a:spAutoFit/>
-            </a:bodyPr>
-            <a:lstStyle/>
-            <a:p>
-              <a:pPr algn="r"/>
-              <a:r>
-                <a:rPr lang="en-US" sz="800" dirty="0">
-                  <a:solidFill>
-                    <a:schemeClr val="tx1">
-                      <a:lumMod val="85000"/>
-                      <a:lumOff val="15000"/>
-                    </a:schemeClr>
-                  </a:solidFill>
-                  <a:latin typeface="Aptos" panose="020B0004020202020204" pitchFamily="34" charset="0"/>
-                </a:rPr>
-                <a:t>100 [-]</a:t>
-              </a:r>
-            </a:p>
-          </p:txBody>
-        </p:sp>
-        <p:pic>
-          <p:nvPicPr>
-            <p:cNvPr id="202" name="Picture 201" descr="A map of the world&#10;&#10;Description automatically generated">
-              <a:extLst>
-                <a:ext uri="{FF2B5EF4-FFF2-40B4-BE49-F238E27FC236}">
-                  <a16:creationId xmlns:a16="http://schemas.microsoft.com/office/drawing/2014/main" id="{28414104-918F-261D-7ED6-E36D8574791F}"/>
-                </a:ext>
-              </a:extLst>
-            </p:cNvPr>
-            <p:cNvPicPr>
-              <a:picLocks noChangeAspect="1"/>
-            </p:cNvPicPr>
-            <p:nvPr/>
-          </p:nvPicPr>
-          <p:blipFill>
-            <a:blip r:embed="rId2">
-              <a:extLst>
-                <a:ext uri="{28A0092B-C50C-407E-A947-70E740481C1C}">
-                  <a14:useLocalDpi xmlns:a14="http://schemas.microsoft.com/office/drawing/2010/main" val="0"/>
-                </a:ext>
-              </a:extLst>
-            </a:blip>
-            <a:srcRect l="11541" t="28876" r="11524" b="67619"/>
-            <a:stretch/>
-          </p:blipFill>
-          <p:spPr>
-            <a:xfrm>
-              <a:off x="885801" y="1813623"/>
-              <a:ext cx="4211580" cy="135652"/>
-            </a:xfrm>
-            <a:prstGeom prst="rect">
-              <a:avLst/>
-            </a:prstGeom>
-          </p:spPr>
-        </p:pic>
-      </p:grpSp>
-      <p:grpSp>
-        <p:nvGrpSpPr>
           <p:cNvPr id="31" name="Group 30">
             <a:extLst>
               <a:ext uri="{FF2B5EF4-FFF2-40B4-BE49-F238E27FC236}">
@@ -5819,7 +4411,7 @@
               <p:nvPr/>
             </p:nvPicPr>
             <p:blipFill>
-              <a:blip r:embed="rId3"/>
+              <a:blip r:embed="rId2"/>
               <a:stretch>
                 <a:fillRect/>
               </a:stretch>
@@ -6621,7 +5213,7 @@
           <p:nvPr/>
         </p:nvPicPr>
         <p:blipFill>
-          <a:blip r:embed="rId4"/>
+          <a:blip r:embed="rId3"/>
           <a:stretch>
             <a:fillRect/>
           </a:stretch>
@@ -7149,12 +5741,454 @@
           </a:p>
         </p:txBody>
       </p:sp>
+      <p:grpSp>
+        <p:nvGrpSpPr>
+          <p:cNvPr id="4" name="Group 3">
+            <a:extLst>
+              <a:ext uri="{FF2B5EF4-FFF2-40B4-BE49-F238E27FC236}">
+                <a16:creationId xmlns:a16="http://schemas.microsoft.com/office/drawing/2014/main" id="{167F9A27-8BEE-AA41-9E4C-3EA5FC31B243}"/>
+              </a:ext>
+            </a:extLst>
+          </p:cNvPr>
+          <p:cNvGrpSpPr/>
+          <p:nvPr/>
+        </p:nvGrpSpPr>
+        <p:grpSpPr>
+          <a:xfrm>
+            <a:off x="584386" y="1933146"/>
+            <a:ext cx="5039656" cy="324080"/>
+            <a:chOff x="388803" y="1933146"/>
+            <a:chExt cx="5039656" cy="324080"/>
+          </a:xfrm>
+        </p:grpSpPr>
+        <p:grpSp>
+          <p:nvGrpSpPr>
+            <p:cNvPr id="5" name="Group 4">
+              <a:extLst>
+                <a:ext uri="{FF2B5EF4-FFF2-40B4-BE49-F238E27FC236}">
+                  <a16:creationId xmlns:a16="http://schemas.microsoft.com/office/drawing/2014/main" id="{37C00166-9583-C38F-69EE-1C603FE82112}"/>
+                </a:ext>
+              </a:extLst>
+            </p:cNvPr>
+            <p:cNvGrpSpPr/>
+            <p:nvPr/>
+          </p:nvGrpSpPr>
+          <p:grpSpPr>
+            <a:xfrm>
+              <a:off x="865097" y="1933146"/>
+              <a:ext cx="4563362" cy="324080"/>
+              <a:chOff x="781948" y="1625195"/>
+              <a:chExt cx="4563362" cy="324080"/>
+            </a:xfrm>
+          </p:grpSpPr>
+          <p:sp>
+            <p:nvSpPr>
+              <p:cNvPr id="196" name="TextBox 195">
+                <a:extLst>
+                  <a:ext uri="{FF2B5EF4-FFF2-40B4-BE49-F238E27FC236}">
+                    <a16:creationId xmlns:a16="http://schemas.microsoft.com/office/drawing/2014/main" id="{7CC1A3FA-0C4D-565E-6E06-A7B7B6B3F72D}"/>
+                  </a:ext>
+                </a:extLst>
+              </p:cNvPr>
+              <p:cNvSpPr txBox="1"/>
+              <p:nvPr/>
+            </p:nvSpPr>
+            <p:spPr>
+              <a:xfrm>
+                <a:off x="781948" y="1625195"/>
+                <a:ext cx="239168" cy="215444"/>
+              </a:xfrm>
+              <a:prstGeom prst="rect">
+                <a:avLst/>
+              </a:prstGeom>
+              <a:noFill/>
+            </p:spPr>
+            <p:txBody>
+              <a:bodyPr wrap="none" rtlCol="0">
+                <a:spAutoFit/>
+              </a:bodyPr>
+              <a:lstStyle/>
+              <a:p>
+                <a:pPr algn="r"/>
+                <a:r>
+                  <a:rPr lang="en-US" sz="800" dirty="0">
+                    <a:solidFill>
+                      <a:schemeClr val="tx1">
+                        <a:lumMod val="85000"/>
+                        <a:lumOff val="15000"/>
+                      </a:schemeClr>
+                    </a:solidFill>
+                    <a:latin typeface="Aptos" panose="020B0004020202020204" pitchFamily="34" charset="0"/>
+                  </a:rPr>
+                  <a:t>0</a:t>
+                </a:r>
+                <a:endParaRPr lang="en-GB" sz="800" dirty="0">
+                  <a:solidFill>
+                    <a:schemeClr val="tx1">
+                      <a:lumMod val="85000"/>
+                      <a:lumOff val="15000"/>
+                    </a:schemeClr>
+                  </a:solidFill>
+                  <a:latin typeface="Aptos" panose="020B0004020202020204" pitchFamily="34" charset="0"/>
+                </a:endParaRPr>
+              </a:p>
+            </p:txBody>
+          </p:sp>
+          <p:sp>
+            <p:nvSpPr>
+              <p:cNvPr id="197" name="TextBox 196">
+                <a:extLst>
+                  <a:ext uri="{FF2B5EF4-FFF2-40B4-BE49-F238E27FC236}">
+                    <a16:creationId xmlns:a16="http://schemas.microsoft.com/office/drawing/2014/main" id="{BD520B40-6521-7067-06E6-DBF62B29380D}"/>
+                  </a:ext>
+                </a:extLst>
+              </p:cNvPr>
+              <p:cNvSpPr txBox="1"/>
+              <p:nvPr/>
+            </p:nvSpPr>
+            <p:spPr>
+              <a:xfrm>
+                <a:off x="1560889" y="1625195"/>
+                <a:ext cx="322525" cy="215444"/>
+              </a:xfrm>
+              <a:prstGeom prst="rect">
+                <a:avLst/>
+              </a:prstGeom>
+              <a:noFill/>
+            </p:spPr>
+            <p:txBody>
+              <a:bodyPr wrap="none" rtlCol="0">
+                <a:spAutoFit/>
+              </a:bodyPr>
+              <a:lstStyle/>
+              <a:p>
+                <a:pPr algn="r"/>
+                <a:r>
+                  <a:rPr lang="en-US" sz="800" dirty="0">
+                    <a:solidFill>
+                      <a:schemeClr val="tx1">
+                        <a:lumMod val="85000"/>
+                        <a:lumOff val="15000"/>
+                      </a:schemeClr>
+                    </a:solidFill>
+                    <a:latin typeface="Aptos" panose="020B0004020202020204" pitchFamily="34" charset="0"/>
+                  </a:rPr>
+                  <a:t>0.1</a:t>
+                </a:r>
+                <a:endParaRPr lang="en-GB" sz="800" dirty="0">
+                  <a:solidFill>
+                    <a:schemeClr val="tx1">
+                      <a:lumMod val="85000"/>
+                      <a:lumOff val="15000"/>
+                    </a:schemeClr>
+                  </a:solidFill>
+                  <a:latin typeface="Aptos" panose="020B0004020202020204" pitchFamily="34" charset="0"/>
+                </a:endParaRPr>
+              </a:p>
+            </p:txBody>
+          </p:sp>
+          <p:sp>
+            <p:nvSpPr>
+              <p:cNvPr id="198" name="TextBox 197">
+                <a:extLst>
+                  <a:ext uri="{FF2B5EF4-FFF2-40B4-BE49-F238E27FC236}">
+                    <a16:creationId xmlns:a16="http://schemas.microsoft.com/office/drawing/2014/main" id="{425B0BD8-56D6-6BEF-F39D-51F09284C9F8}"/>
+                  </a:ext>
+                </a:extLst>
+              </p:cNvPr>
+              <p:cNvSpPr txBox="1"/>
+              <p:nvPr/>
+            </p:nvSpPr>
+            <p:spPr>
+              <a:xfrm>
+                <a:off x="2388727" y="1625195"/>
+                <a:ext cx="322525" cy="215444"/>
+              </a:xfrm>
+              <a:prstGeom prst="rect">
+                <a:avLst/>
+              </a:prstGeom>
+              <a:noFill/>
+            </p:spPr>
+            <p:txBody>
+              <a:bodyPr wrap="none" rtlCol="0">
+                <a:spAutoFit/>
+              </a:bodyPr>
+              <a:lstStyle/>
+              <a:p>
+                <a:pPr algn="r"/>
+                <a:r>
+                  <a:rPr lang="en-US" sz="800" dirty="0">
+                    <a:solidFill>
+                      <a:schemeClr val="tx1">
+                        <a:lumMod val="85000"/>
+                        <a:lumOff val="15000"/>
+                      </a:schemeClr>
+                    </a:solidFill>
+                    <a:latin typeface="Aptos" panose="020B0004020202020204" pitchFamily="34" charset="0"/>
+                  </a:rPr>
+                  <a:t>0.3</a:t>
+                </a:r>
+              </a:p>
+            </p:txBody>
+          </p:sp>
+          <p:sp>
+            <p:nvSpPr>
+              <p:cNvPr id="199" name="TextBox 198">
+                <a:extLst>
+                  <a:ext uri="{FF2B5EF4-FFF2-40B4-BE49-F238E27FC236}">
+                    <a16:creationId xmlns:a16="http://schemas.microsoft.com/office/drawing/2014/main" id="{B29B6A8F-84C1-93E5-25DA-FD9E21561492}"/>
+                  </a:ext>
+                </a:extLst>
+              </p:cNvPr>
+              <p:cNvSpPr txBox="1"/>
+              <p:nvPr/>
+            </p:nvSpPr>
+            <p:spPr>
+              <a:xfrm>
+                <a:off x="3240196" y="1625195"/>
+                <a:ext cx="322525" cy="215444"/>
+              </a:xfrm>
+              <a:prstGeom prst="rect">
+                <a:avLst/>
+              </a:prstGeom>
+              <a:noFill/>
+            </p:spPr>
+            <p:txBody>
+              <a:bodyPr wrap="none" rtlCol="0">
+                <a:spAutoFit/>
+              </a:bodyPr>
+              <a:lstStyle/>
+              <a:p>
+                <a:pPr algn="r"/>
+                <a:r>
+                  <a:rPr lang="en-US" sz="800" dirty="0">
+                    <a:solidFill>
+                      <a:schemeClr val="tx1">
+                        <a:lumMod val="85000"/>
+                        <a:lumOff val="15000"/>
+                      </a:schemeClr>
+                    </a:solidFill>
+                    <a:latin typeface="Aptos" panose="020B0004020202020204" pitchFamily="34" charset="0"/>
+                  </a:rPr>
+                  <a:t>0.5</a:t>
+                </a:r>
+                <a:endParaRPr lang="en-GB" sz="800" dirty="0">
+                  <a:solidFill>
+                    <a:schemeClr val="tx1">
+                      <a:lumMod val="85000"/>
+                      <a:lumOff val="15000"/>
+                    </a:schemeClr>
+                  </a:solidFill>
+                  <a:latin typeface="Aptos" panose="020B0004020202020204" pitchFamily="34" charset="0"/>
+                </a:endParaRPr>
+              </a:p>
+            </p:txBody>
+          </p:sp>
+          <p:sp>
+            <p:nvSpPr>
+              <p:cNvPr id="200" name="TextBox 199">
+                <a:extLst>
+                  <a:ext uri="{FF2B5EF4-FFF2-40B4-BE49-F238E27FC236}">
+                    <a16:creationId xmlns:a16="http://schemas.microsoft.com/office/drawing/2014/main" id="{7C1BD1C6-2C2C-5E2E-B681-1FD01FB1AFF0}"/>
+                  </a:ext>
+                </a:extLst>
+              </p:cNvPr>
+              <p:cNvSpPr txBox="1"/>
+              <p:nvPr/>
+            </p:nvSpPr>
+            <p:spPr>
+              <a:xfrm>
+                <a:off x="4117248" y="1625195"/>
+                <a:ext cx="239168" cy="215444"/>
+              </a:xfrm>
+              <a:prstGeom prst="rect">
+                <a:avLst/>
+              </a:prstGeom>
+              <a:noFill/>
+            </p:spPr>
+            <p:txBody>
+              <a:bodyPr wrap="none" rtlCol="0">
+                <a:spAutoFit/>
+              </a:bodyPr>
+              <a:lstStyle/>
+              <a:p>
+                <a:pPr algn="r"/>
+                <a:r>
+                  <a:rPr lang="en-US" sz="800" dirty="0">
+                    <a:solidFill>
+                      <a:schemeClr val="tx1">
+                        <a:lumMod val="85000"/>
+                        <a:lumOff val="15000"/>
+                      </a:schemeClr>
+                    </a:solidFill>
+                    <a:latin typeface="Aptos" panose="020B0004020202020204" pitchFamily="34" charset="0"/>
+                  </a:rPr>
+                  <a:t>1</a:t>
+                </a:r>
+                <a:endParaRPr lang="en-GB" sz="800" dirty="0">
+                  <a:solidFill>
+                    <a:schemeClr val="tx1">
+                      <a:lumMod val="85000"/>
+                      <a:lumOff val="15000"/>
+                    </a:schemeClr>
+                  </a:solidFill>
+                  <a:latin typeface="Aptos" panose="020B0004020202020204" pitchFamily="34" charset="0"/>
+                </a:endParaRPr>
+              </a:p>
+            </p:txBody>
+          </p:sp>
+          <p:sp>
+            <p:nvSpPr>
+              <p:cNvPr id="201" name="TextBox 200">
+                <a:extLst>
+                  <a:ext uri="{FF2B5EF4-FFF2-40B4-BE49-F238E27FC236}">
+                    <a16:creationId xmlns:a16="http://schemas.microsoft.com/office/drawing/2014/main" id="{7A7E2A95-510C-C0AA-20A4-4BB5662FBF0D}"/>
+                  </a:ext>
+                </a:extLst>
+              </p:cNvPr>
+              <p:cNvSpPr txBox="1"/>
+              <p:nvPr/>
+            </p:nvSpPr>
+            <p:spPr>
+              <a:xfrm>
+                <a:off x="4880118" y="1625195"/>
+                <a:ext cx="465192" cy="215444"/>
+              </a:xfrm>
+              <a:prstGeom prst="rect">
+                <a:avLst/>
+              </a:prstGeom>
+              <a:noFill/>
+            </p:spPr>
+            <p:txBody>
+              <a:bodyPr wrap="none" rtlCol="0">
+                <a:spAutoFit/>
+              </a:bodyPr>
+              <a:lstStyle/>
+              <a:p>
+                <a:pPr algn="r"/>
+                <a:r>
+                  <a:rPr lang="en-US" sz="800" dirty="0">
+                    <a:solidFill>
+                      <a:schemeClr val="tx1">
+                        <a:lumMod val="85000"/>
+                        <a:lumOff val="15000"/>
+                      </a:schemeClr>
+                    </a:solidFill>
+                    <a:latin typeface="Aptos" panose="020B0004020202020204" pitchFamily="34" charset="0"/>
+                  </a:rPr>
+                  <a:t>100 [-]</a:t>
+                </a:r>
+              </a:p>
+            </p:txBody>
+          </p:sp>
+          <p:pic>
+            <p:nvPicPr>
+              <p:cNvPr id="202" name="Picture 201" descr="A map of the world&#10;&#10;Description automatically generated">
+                <a:extLst>
+                  <a:ext uri="{FF2B5EF4-FFF2-40B4-BE49-F238E27FC236}">
+                    <a16:creationId xmlns:a16="http://schemas.microsoft.com/office/drawing/2014/main" id="{28414104-918F-261D-7ED6-E36D8574791F}"/>
+                  </a:ext>
+                </a:extLst>
+              </p:cNvPr>
+              <p:cNvPicPr>
+                <a:picLocks noChangeAspect="1"/>
+              </p:cNvPicPr>
+              <p:nvPr/>
+            </p:nvPicPr>
+            <p:blipFill>
+              <a:blip r:embed="rId4">
+                <a:extLst>
+                  <a:ext uri="{28A0092B-C50C-407E-A947-70E740481C1C}">
+                    <a14:useLocalDpi xmlns:a14="http://schemas.microsoft.com/office/drawing/2010/main" val="0"/>
+                  </a:ext>
+                </a:extLst>
+              </a:blip>
+              <a:srcRect l="11541" t="28876" r="11524" b="67619"/>
+              <a:stretch/>
+            </p:blipFill>
+            <p:spPr>
+              <a:xfrm>
+                <a:off x="885801" y="1813623"/>
+                <a:ext cx="4211580" cy="135652"/>
+              </a:xfrm>
+              <a:prstGeom prst="rect">
+                <a:avLst/>
+              </a:prstGeom>
+            </p:spPr>
+          </p:pic>
+        </p:grpSp>
+        <p:sp>
+          <p:nvSpPr>
+            <p:cNvPr id="3" name="TextBox 2">
+              <a:extLst>
+                <a:ext uri="{FF2B5EF4-FFF2-40B4-BE49-F238E27FC236}">
+                  <a16:creationId xmlns:a16="http://schemas.microsoft.com/office/drawing/2014/main" id="{633376AF-A334-D202-54CF-B65F8E7AEAAD}"/>
+                </a:ext>
+              </a:extLst>
+            </p:cNvPr>
+            <p:cNvSpPr txBox="1"/>
+            <p:nvPr/>
+          </p:nvSpPr>
+          <p:spPr>
+            <a:xfrm>
+              <a:off x="388803" y="2041782"/>
+              <a:ext cx="579005" cy="215444"/>
+            </a:xfrm>
+            <a:prstGeom prst="rect">
+              <a:avLst/>
+            </a:prstGeom>
+            <a:noFill/>
+          </p:spPr>
+          <p:txBody>
+            <a:bodyPr wrap="none" rtlCol="0">
+              <a:spAutoFit/>
+            </a:bodyPr>
+            <a:lstStyle/>
+            <a:p>
+              <a:pPr algn="r"/>
+              <a:r>
+                <a:rPr lang="en-US" sz="800" dirty="0">
+                  <a:solidFill>
+                    <a:schemeClr val="tx1">
+                      <a:lumMod val="85000"/>
+                      <a:lumOff val="15000"/>
+                    </a:schemeClr>
+                  </a:solidFill>
+                  <a:latin typeface="Aptos" panose="020B0004020202020204" pitchFamily="34" charset="0"/>
+                </a:rPr>
+                <a:t>MAE</a:t>
+              </a:r>
+              <a:r>
+                <a:rPr lang="en-US" sz="800" baseline="-25000" dirty="0">
+                  <a:solidFill>
+                    <a:schemeClr val="tx1">
+                      <a:lumMod val="85000"/>
+                      <a:lumOff val="15000"/>
+                    </a:schemeClr>
+                  </a:solidFill>
+                  <a:latin typeface="Aptos" panose="020B0004020202020204" pitchFamily="34" charset="0"/>
+                </a:rPr>
+                <a:t>NORM</a:t>
+              </a:r>
+              <a:endParaRPr lang="en-GB" sz="800" baseline="-25000" dirty="0">
+                <a:solidFill>
+                  <a:schemeClr val="tx1">
+                    <a:lumMod val="85000"/>
+                    <a:lumOff val="15000"/>
+                  </a:schemeClr>
+                </a:solidFill>
+                <a:latin typeface="Aptos" panose="020B0004020202020204" pitchFamily="34" charset="0"/>
+              </a:endParaRPr>
+            </a:p>
+          </p:txBody>
+        </p:sp>
+      </p:grpSp>
       <p:pic>
         <p:nvPicPr>
-          <p:cNvPr id="39" name="Picture 38">
+          <p:cNvPr id="15" name="Picture 14">
             <a:extLst>
               <a:ext uri="{FF2B5EF4-FFF2-40B4-BE49-F238E27FC236}">
-                <a16:creationId xmlns:a16="http://schemas.microsoft.com/office/drawing/2014/main" id="{3987FFB9-0C0B-3B87-6170-9311493A8AF1}"/>
+                <a16:creationId xmlns:a16="http://schemas.microsoft.com/office/drawing/2014/main" id="{393B26DB-5663-84F1-6765-6D4068457387}"/>
               </a:ext>
             </a:extLst>
           </p:cNvPr>
@@ -7171,8 +6205,8 @@
         </p:blipFill>
         <p:spPr>
           <a:xfrm>
-            <a:off x="2255456" y="4447982"/>
-            <a:ext cx="2664000" cy="1656605"/>
+            <a:off x="2480165" y="4411771"/>
+            <a:ext cx="2119453" cy="1692000"/>
           </a:xfrm>
           <a:prstGeom prst="rect">
             <a:avLst/>

</xml_diff>